<commit_message>
Bug fixes, SC Site Volunteer Calendar added
but fixes, added a calendar to let SC see volunteer activity at a glance
</commit_message>
<xml_diff>
--- a/Activity Flow.pptx
+++ b/Activity Flow.pptx
@@ -289,7 +289,7 @@
           <a:p>
             <a:fld id="{C8F63C33-E5D7-9F4F-83CE-651F8C0917C8}" type="datetimeFigureOut">
               <a:rPr lang="en-US" smtClean="0"/>
-              <a:t>9/22/17</a:t>
+              <a:t>10/2/17</a:t>
             </a:fld>
             <a:endParaRPr lang="en-US"/>
           </a:p>
@@ -459,7 +459,7 @@
           <a:p>
             <a:fld id="{C8F63C33-E5D7-9F4F-83CE-651F8C0917C8}" type="datetimeFigureOut">
               <a:rPr lang="en-US" smtClean="0"/>
-              <a:t>9/22/17</a:t>
+              <a:t>10/2/17</a:t>
             </a:fld>
             <a:endParaRPr lang="en-US"/>
           </a:p>
@@ -639,7 +639,7 @@
           <a:p>
             <a:fld id="{C8F63C33-E5D7-9F4F-83CE-651F8C0917C8}" type="datetimeFigureOut">
               <a:rPr lang="en-US" smtClean="0"/>
-              <a:t>9/22/17</a:t>
+              <a:t>10/2/17</a:t>
             </a:fld>
             <a:endParaRPr lang="en-US"/>
           </a:p>
@@ -809,7 +809,7 @@
           <a:p>
             <a:fld id="{C8F63C33-E5D7-9F4F-83CE-651F8C0917C8}" type="datetimeFigureOut">
               <a:rPr lang="en-US" smtClean="0"/>
-              <a:t>9/22/17</a:t>
+              <a:t>10/2/17</a:t>
             </a:fld>
             <a:endParaRPr lang="en-US"/>
           </a:p>
@@ -1055,7 +1055,7 @@
           <a:p>
             <a:fld id="{C8F63C33-E5D7-9F4F-83CE-651F8C0917C8}" type="datetimeFigureOut">
               <a:rPr lang="en-US" smtClean="0"/>
-              <a:t>9/22/17</a:t>
+              <a:t>10/2/17</a:t>
             </a:fld>
             <a:endParaRPr lang="en-US"/>
           </a:p>
@@ -1343,7 +1343,7 @@
           <a:p>
             <a:fld id="{C8F63C33-E5D7-9F4F-83CE-651F8C0917C8}" type="datetimeFigureOut">
               <a:rPr lang="en-US" smtClean="0"/>
-              <a:t>9/22/17</a:t>
+              <a:t>10/2/17</a:t>
             </a:fld>
             <a:endParaRPr lang="en-US"/>
           </a:p>
@@ -1765,7 +1765,7 @@
           <a:p>
             <a:fld id="{C8F63C33-E5D7-9F4F-83CE-651F8C0917C8}" type="datetimeFigureOut">
               <a:rPr lang="en-US" smtClean="0"/>
-              <a:t>9/22/17</a:t>
+              <a:t>10/2/17</a:t>
             </a:fld>
             <a:endParaRPr lang="en-US"/>
           </a:p>
@@ -1883,7 +1883,7 @@
           <a:p>
             <a:fld id="{C8F63C33-E5D7-9F4F-83CE-651F8C0917C8}" type="datetimeFigureOut">
               <a:rPr lang="en-US" smtClean="0"/>
-              <a:t>9/22/17</a:t>
+              <a:t>10/2/17</a:t>
             </a:fld>
             <a:endParaRPr lang="en-US"/>
           </a:p>
@@ -1978,7 +1978,7 @@
           <a:p>
             <a:fld id="{C8F63C33-E5D7-9F4F-83CE-651F8C0917C8}" type="datetimeFigureOut">
               <a:rPr lang="en-US" smtClean="0"/>
-              <a:t>9/22/17</a:t>
+              <a:t>10/2/17</a:t>
             </a:fld>
             <a:endParaRPr lang="en-US"/>
           </a:p>
@@ -2255,7 +2255,7 @@
           <a:p>
             <a:fld id="{C8F63C33-E5D7-9F4F-83CE-651F8C0917C8}" type="datetimeFigureOut">
               <a:rPr lang="en-US" smtClean="0"/>
-              <a:t>9/22/17</a:t>
+              <a:t>10/2/17</a:t>
             </a:fld>
             <a:endParaRPr lang="en-US"/>
           </a:p>
@@ -2508,7 +2508,7 @@
           <a:p>
             <a:fld id="{C8F63C33-E5D7-9F4F-83CE-651F8C0917C8}" type="datetimeFigureOut">
               <a:rPr lang="en-US" smtClean="0"/>
-              <a:t>9/22/17</a:t>
+              <a:t>10/2/17</a:t>
             </a:fld>
             <a:endParaRPr lang="en-US"/>
           </a:p>
@@ -2721,7 +2721,7 @@
           <a:p>
             <a:fld id="{C8F63C33-E5D7-9F4F-83CE-651F8C0917C8}" type="datetimeFigureOut">
               <a:rPr lang="en-US" smtClean="0"/>
-              <a:t>9/22/17</a:t>
+              <a:t>10/2/17</a:t>
             </a:fld>
             <a:endParaRPr lang="en-US"/>
           </a:p>
@@ -4576,7 +4576,7 @@
         </p:nvSpPr>
         <p:spPr>
           <a:xfrm>
-            <a:off x="2495309" y="4442566"/>
+            <a:off x="1556417" y="4700597"/>
             <a:ext cx="737251" cy="276999"/>
           </a:xfrm>
           <a:prstGeom prst="rect">
@@ -4607,7 +4607,7 @@
         </p:nvSpPr>
         <p:spPr>
           <a:xfrm>
-            <a:off x="2092037" y="4165230"/>
+            <a:off x="1153145" y="4423261"/>
             <a:ext cx="1420091" cy="277336"/>
           </a:xfrm>
           <a:prstGeom prst="rect">
@@ -4691,8 +4691,8 @@
         </p:nvCxnSpPr>
         <p:spPr>
           <a:xfrm rot="16200000" flipH="1">
-            <a:off x="270225" y="2482086"/>
-            <a:ext cx="1851768" cy="1791856"/>
+            <a:off x="-380588" y="3028195"/>
+            <a:ext cx="2214503" cy="852964"/>
           </a:xfrm>
           <a:prstGeom prst="curvedConnector2">
             <a:avLst/>
@@ -4726,12 +4726,15 @@
           <p:nvPr/>
         </p:nvCxnSpPr>
         <p:spPr>
-          <a:xfrm rot="16200000" flipH="1">
-            <a:off x="1541666" y="3753526"/>
-            <a:ext cx="452551" cy="648191"/>
-          </a:xfrm>
-          <a:prstGeom prst="curvedConnector2">
-            <a:avLst/>
+          <a:xfrm rot="5400000">
+            <a:off x="943205" y="4061288"/>
+            <a:ext cx="710582" cy="290701"/>
+          </a:xfrm>
+          <a:prstGeom prst="curvedConnector4">
+            <a:avLst>
+              <a:gd name="adj1" fmla="val 40243"/>
+              <a:gd name="adj2" fmla="val 178638"/>
+            </a:avLst>
           </a:prstGeom>
           <a:ln w="19050" cmpd="sng">
             <a:tailEnd type="arrow"/>
@@ -4760,7 +4763,7 @@
         </p:nvSpPr>
         <p:spPr>
           <a:xfrm>
-            <a:off x="4666270" y="3990015"/>
+            <a:off x="5663474" y="3990015"/>
             <a:ext cx="941033" cy="276999"/>
           </a:xfrm>
           <a:prstGeom prst="rect">
@@ -4791,7 +4794,7 @@
         </p:nvSpPr>
         <p:spPr>
           <a:xfrm>
-            <a:off x="4364889" y="3712679"/>
+            <a:off x="5362093" y="3712679"/>
             <a:ext cx="1420091" cy="277336"/>
           </a:xfrm>
           <a:prstGeom prst="rect">
@@ -4834,7 +4837,7 @@
         </p:nvSpPr>
         <p:spPr>
           <a:xfrm>
-            <a:off x="6706829" y="3990014"/>
+            <a:off x="7528604" y="3990014"/>
             <a:ext cx="1082348" cy="276999"/>
           </a:xfrm>
           <a:prstGeom prst="rect">
@@ -4865,7 +4868,7 @@
         </p:nvSpPr>
         <p:spPr>
           <a:xfrm>
-            <a:off x="6476105" y="3712678"/>
+            <a:off x="7297880" y="3712678"/>
             <a:ext cx="1420091" cy="277336"/>
           </a:xfrm>
           <a:prstGeom prst="rect">
@@ -4908,7 +4911,7 @@
         </p:nvSpPr>
         <p:spPr>
           <a:xfrm>
-            <a:off x="4606872" y="4980398"/>
+            <a:off x="3681482" y="4995018"/>
             <a:ext cx="1059830" cy="276999"/>
           </a:xfrm>
           <a:prstGeom prst="rect">
@@ -4939,7 +4942,7 @@
         </p:nvSpPr>
         <p:spPr>
           <a:xfrm>
-            <a:off x="4364889" y="4703062"/>
+            <a:off x="3439499" y="4717682"/>
             <a:ext cx="1420091" cy="277336"/>
           </a:xfrm>
           <a:prstGeom prst="rect">
@@ -4982,7 +4985,7 @@
         </p:nvSpPr>
         <p:spPr>
           <a:xfrm>
-            <a:off x="6649124" y="4996901"/>
+            <a:off x="5993522" y="4977596"/>
             <a:ext cx="1197764" cy="276999"/>
           </a:xfrm>
           <a:prstGeom prst="rect">
@@ -5013,7 +5016,7 @@
         </p:nvSpPr>
         <p:spPr>
           <a:xfrm>
-            <a:off x="6476105" y="4719565"/>
+            <a:off x="5820503" y="4700260"/>
             <a:ext cx="1420091" cy="277336"/>
           </a:xfrm>
           <a:prstGeom prst="rect">
@@ -5056,7 +5059,7 @@
         </p:nvSpPr>
         <p:spPr>
           <a:xfrm>
-            <a:off x="6573367" y="5937040"/>
+            <a:off x="5917765" y="5917735"/>
             <a:ext cx="1349273" cy="276999"/>
           </a:xfrm>
           <a:prstGeom prst="rect">
@@ -5087,7 +5090,7 @@
         </p:nvSpPr>
         <p:spPr>
           <a:xfrm>
-            <a:off x="6476105" y="5659704"/>
+            <a:off x="5820503" y="5640399"/>
             <a:ext cx="1420091" cy="277336"/>
           </a:xfrm>
           <a:prstGeom prst="rect">
@@ -5127,16 +5130,19 @@
           <p:cNvPr id="104" name="Curved Connector 103"/>
           <p:cNvCxnSpPr>
             <a:stCxn id="74" idx="3"/>
+            <a:endCxn id="63" idx="1"/>
           </p:cNvCxnSpPr>
           <p:nvPr/>
         </p:nvCxnSpPr>
         <p:spPr>
           <a:xfrm flipV="1">
-            <a:off x="3512128" y="2879586"/>
-            <a:ext cx="229698" cy="1424312"/>
-          </a:xfrm>
-          <a:prstGeom prst="curvedConnector2">
-            <a:avLst/>
+            <a:off x="2573236" y="2729466"/>
+            <a:ext cx="1168589" cy="1832463"/>
+          </a:xfrm>
+          <a:prstGeom prst="curvedConnector3">
+            <a:avLst>
+              <a:gd name="adj1" fmla="val 50000"/>
+            </a:avLst>
           </a:prstGeom>
           <a:ln w="19050" cmpd="sng">
             <a:tailEnd type="arrow"/>
@@ -5162,14 +5168,14 @@
           <p:cNvPr id="107" name="Curved Connector 106"/>
           <p:cNvCxnSpPr>
             <a:stCxn id="74" idx="3"/>
-            <a:endCxn id="95" idx="1"/>
+            <a:endCxn id="82" idx="1"/>
           </p:cNvCxnSpPr>
           <p:nvPr/>
         </p:nvCxnSpPr>
         <p:spPr>
           <a:xfrm flipV="1">
-            <a:off x="3512128" y="3851347"/>
-            <a:ext cx="852761" cy="452551"/>
+            <a:off x="2573236" y="3851346"/>
+            <a:ext cx="889244" cy="710583"/>
           </a:xfrm>
           <a:prstGeom prst="curvedConnector3">
             <a:avLst>
@@ -5206,8 +5212,8 @@
         </p:nvCxnSpPr>
         <p:spPr>
           <a:xfrm>
-            <a:off x="3512128" y="4303898"/>
-            <a:ext cx="852761" cy="537832"/>
+            <a:off x="2573236" y="4561929"/>
+            <a:ext cx="866263" cy="294421"/>
           </a:xfrm>
           <a:prstGeom prst="curvedConnector3">
             <a:avLst>
@@ -5241,7 +5247,7 @@
         </p:nvSpPr>
         <p:spPr>
           <a:xfrm>
-            <a:off x="4627096" y="5937040"/>
+            <a:off x="3648321" y="5937973"/>
             <a:ext cx="1172116" cy="276999"/>
           </a:xfrm>
           <a:prstGeom prst="rect">
@@ -5272,7 +5278,7 @@
         </p:nvSpPr>
         <p:spPr>
           <a:xfrm>
-            <a:off x="4441255" y="5659704"/>
+            <a:off x="3462480" y="5660637"/>
             <a:ext cx="1420091" cy="277336"/>
           </a:xfrm>
           <a:prstGeom prst="rect">
@@ -5318,8 +5324,8 @@
         </p:nvCxnSpPr>
         <p:spPr>
           <a:xfrm>
-            <a:off x="3512128" y="4303898"/>
-            <a:ext cx="929127" cy="1494474"/>
+            <a:off x="2573236" y="4561929"/>
+            <a:ext cx="889244" cy="1237376"/>
           </a:xfrm>
           <a:prstGeom prst="curvedConnector3">
             <a:avLst>
@@ -5356,8 +5362,8 @@
         </p:nvCxnSpPr>
         <p:spPr>
           <a:xfrm flipV="1">
-            <a:off x="5784980" y="3851346"/>
-            <a:ext cx="691125" cy="1"/>
+            <a:off x="6782184" y="3851346"/>
+            <a:ext cx="515696" cy="1"/>
           </a:xfrm>
           <a:prstGeom prst="curvedConnector3">
             <a:avLst>
@@ -5393,9 +5399,9 @@
           <p:nvPr/>
         </p:nvCxnSpPr>
         <p:spPr>
-          <a:xfrm>
-            <a:off x="5784980" y="4841730"/>
-            <a:ext cx="691125" cy="16503"/>
+          <a:xfrm flipV="1">
+            <a:off x="4859590" y="4838928"/>
+            <a:ext cx="960913" cy="17422"/>
           </a:xfrm>
           <a:prstGeom prst="curvedConnector3">
             <a:avLst>
@@ -5432,8 +5438,8 @@
         </p:nvCxnSpPr>
         <p:spPr>
           <a:xfrm>
-            <a:off x="5784980" y="4841730"/>
-            <a:ext cx="691125" cy="956642"/>
+            <a:off x="4859590" y="4856350"/>
+            <a:ext cx="960913" cy="922717"/>
           </a:xfrm>
           <a:prstGeom prst="curvedConnector3">
             <a:avLst>
@@ -5690,6 +5696,118 @@
           <a:ln w="19050" cmpd="sng">
             <a:headEnd type="arrow"/>
             <a:tailEnd type="none"/>
+          </a:ln>
+        </p:spPr>
+        <p:style>
+          <a:lnRef idx="1">
+            <a:schemeClr val="dk1"/>
+          </a:lnRef>
+          <a:fillRef idx="0">
+            <a:schemeClr val="dk1"/>
+          </a:fillRef>
+          <a:effectRef idx="0">
+            <a:schemeClr val="dk1"/>
+          </a:effectRef>
+          <a:fontRef idx="minor">
+            <a:schemeClr val="tx1"/>
+          </a:fontRef>
+        </p:style>
+      </p:cxnSp>
+      <p:sp>
+        <p:nvSpPr>
+          <p:cNvPr id="81" name="TextBox 80"/>
+          <p:cNvSpPr txBox="1"/>
+          <p:nvPr/>
+        </p:nvSpPr>
+        <p:spPr>
+          <a:xfrm>
+            <a:off x="3423650" y="3990014"/>
+            <a:ext cx="1497751" cy="276999"/>
+          </a:xfrm>
+          <a:prstGeom prst="rect">
+            <a:avLst/>
+          </a:prstGeom>
+          <a:noFill/>
+        </p:spPr>
+        <p:txBody>
+          <a:bodyPr wrap="none" rtlCol="0">
+            <a:spAutoFit/>
+          </a:bodyPr>
+          <a:lstStyle/>
+          <a:p>
+            <a:pPr algn="ctr"/>
+            <a:r>
+              <a:rPr lang="en-US" sz="1200" dirty="0" err="1" smtClean="0"/>
+              <a:t>A_SCSiteVolCalendar</a:t>
+            </a:r>
+            <a:endParaRPr lang="en-US" sz="1200" dirty="0"/>
+          </a:p>
+        </p:txBody>
+      </p:sp>
+      <p:sp>
+        <p:nvSpPr>
+          <p:cNvPr id="82" name="Rectangle 81"/>
+          <p:cNvSpPr/>
+          <p:nvPr/>
+        </p:nvSpPr>
+        <p:spPr>
+          <a:xfrm>
+            <a:off x="3462480" y="3712678"/>
+            <a:ext cx="1420091" cy="277336"/>
+          </a:xfrm>
+          <a:prstGeom prst="rect">
+            <a:avLst/>
+          </a:prstGeom>
+          <a:ln/>
+        </p:spPr>
+        <p:style>
+          <a:lnRef idx="2">
+            <a:schemeClr val="dk1"/>
+          </a:lnRef>
+          <a:fillRef idx="1">
+            <a:schemeClr val="lt1"/>
+          </a:fillRef>
+          <a:effectRef idx="0">
+            <a:schemeClr val="dk1"/>
+          </a:effectRef>
+          <a:fontRef idx="minor">
+            <a:schemeClr val="dk1"/>
+          </a:fontRef>
+        </p:style>
+        <p:txBody>
+          <a:bodyPr rtlCol="0" anchor="ctr"/>
+          <a:lstStyle/>
+          <a:p>
+            <a:pPr algn="ctr"/>
+            <a:r>
+              <a:rPr lang="en-US" sz="1200" dirty="0" err="1" smtClean="0"/>
+              <a:t>SCSiteVolCalendar</a:t>
+            </a:r>
+            <a:endParaRPr lang="en-US" sz="1200" dirty="0" smtClean="0"/>
+          </a:p>
+        </p:txBody>
+      </p:sp>
+      <p:cxnSp>
+        <p:nvCxnSpPr>
+          <p:cNvPr id="84" name="Curved Connector 83"/>
+          <p:cNvCxnSpPr>
+            <a:stCxn id="82" idx="3"/>
+            <a:endCxn id="95" idx="1"/>
+          </p:cNvCxnSpPr>
+          <p:nvPr/>
+        </p:nvCxnSpPr>
+        <p:spPr>
+          <a:xfrm>
+            <a:off x="4882571" y="3851346"/>
+            <a:ext cx="479522" cy="1"/>
+          </a:xfrm>
+          <a:prstGeom prst="curvedConnector3">
+            <a:avLst>
+              <a:gd name="adj1" fmla="val 50000"/>
+            </a:avLst>
+          </a:prstGeom>
+          <a:ln w="19050" cmpd="sng">
+            <a:tailEnd type="arrow"/>
           </a:ln>
         </p:spPr>
         <p:style>

</xml_diff>

<commit_message>
Android version is functional
vitaadmin is still wip; Android version has a release build in the
root, ready for disty
</commit_message>
<xml_diff>
--- a/Activity Flow.pptx
+++ b/Activity Flow.pptx
@@ -289,7 +289,7 @@
           <a:p>
             <a:fld id="{C8F63C33-E5D7-9F4F-83CE-651F8C0917C8}" type="datetimeFigureOut">
               <a:rPr lang="en-US" smtClean="0"/>
-              <a:t>10/2/17</a:t>
+              <a:t>11/22/17</a:t>
             </a:fld>
             <a:endParaRPr lang="en-US"/>
           </a:p>
@@ -459,7 +459,7 @@
           <a:p>
             <a:fld id="{C8F63C33-E5D7-9F4F-83CE-651F8C0917C8}" type="datetimeFigureOut">
               <a:rPr lang="en-US" smtClean="0"/>
-              <a:t>10/2/17</a:t>
+              <a:t>11/22/17</a:t>
             </a:fld>
             <a:endParaRPr lang="en-US"/>
           </a:p>
@@ -639,7 +639,7 @@
           <a:p>
             <a:fld id="{C8F63C33-E5D7-9F4F-83CE-651F8C0917C8}" type="datetimeFigureOut">
               <a:rPr lang="en-US" smtClean="0"/>
-              <a:t>10/2/17</a:t>
+              <a:t>11/22/17</a:t>
             </a:fld>
             <a:endParaRPr lang="en-US"/>
           </a:p>
@@ -809,7 +809,7 @@
           <a:p>
             <a:fld id="{C8F63C33-E5D7-9F4F-83CE-651F8C0917C8}" type="datetimeFigureOut">
               <a:rPr lang="en-US" smtClean="0"/>
-              <a:t>10/2/17</a:t>
+              <a:t>11/22/17</a:t>
             </a:fld>
             <a:endParaRPr lang="en-US"/>
           </a:p>
@@ -1055,7 +1055,7 @@
           <a:p>
             <a:fld id="{C8F63C33-E5D7-9F4F-83CE-651F8C0917C8}" type="datetimeFigureOut">
               <a:rPr lang="en-US" smtClean="0"/>
-              <a:t>10/2/17</a:t>
+              <a:t>11/22/17</a:t>
             </a:fld>
             <a:endParaRPr lang="en-US"/>
           </a:p>
@@ -1343,7 +1343,7 @@
           <a:p>
             <a:fld id="{C8F63C33-E5D7-9F4F-83CE-651F8C0917C8}" type="datetimeFigureOut">
               <a:rPr lang="en-US" smtClean="0"/>
-              <a:t>10/2/17</a:t>
+              <a:t>11/22/17</a:t>
             </a:fld>
             <a:endParaRPr lang="en-US"/>
           </a:p>
@@ -1765,7 +1765,7 @@
           <a:p>
             <a:fld id="{C8F63C33-E5D7-9F4F-83CE-651F8C0917C8}" type="datetimeFigureOut">
               <a:rPr lang="en-US" smtClean="0"/>
-              <a:t>10/2/17</a:t>
+              <a:t>11/22/17</a:t>
             </a:fld>
             <a:endParaRPr lang="en-US"/>
           </a:p>
@@ -1883,7 +1883,7 @@
           <a:p>
             <a:fld id="{C8F63C33-E5D7-9F4F-83CE-651F8C0917C8}" type="datetimeFigureOut">
               <a:rPr lang="en-US" smtClean="0"/>
-              <a:t>10/2/17</a:t>
+              <a:t>11/22/17</a:t>
             </a:fld>
             <a:endParaRPr lang="en-US"/>
           </a:p>
@@ -1978,7 +1978,7 @@
           <a:p>
             <a:fld id="{C8F63C33-E5D7-9F4F-83CE-651F8C0917C8}" type="datetimeFigureOut">
               <a:rPr lang="en-US" smtClean="0"/>
-              <a:t>10/2/17</a:t>
+              <a:t>11/22/17</a:t>
             </a:fld>
             <a:endParaRPr lang="en-US"/>
           </a:p>
@@ -2255,7 +2255,7 @@
           <a:p>
             <a:fld id="{C8F63C33-E5D7-9F4F-83CE-651F8C0917C8}" type="datetimeFigureOut">
               <a:rPr lang="en-US" smtClean="0"/>
-              <a:t>10/2/17</a:t>
+              <a:t>11/22/17</a:t>
             </a:fld>
             <a:endParaRPr lang="en-US"/>
           </a:p>
@@ -2508,7 +2508,7 @@
           <a:p>
             <a:fld id="{C8F63C33-E5D7-9F4F-83CE-651F8C0917C8}" type="datetimeFigureOut">
               <a:rPr lang="en-US" smtClean="0"/>
-              <a:t>10/2/17</a:t>
+              <a:t>11/22/17</a:t>
             </a:fld>
             <a:endParaRPr lang="en-US"/>
           </a:p>
@@ -2721,7 +2721,7 @@
           <a:p>
             <a:fld id="{C8F63C33-E5D7-9F4F-83CE-651F8C0917C8}" type="datetimeFigureOut">
               <a:rPr lang="en-US" smtClean="0"/>
-              <a:t>10/2/17</a:t>
+              <a:t>11/22/17</a:t>
             </a:fld>
             <a:endParaRPr lang="en-US"/>
           </a:p>
@@ -3172,8 +3172,8 @@
         </p:nvSpPr>
         <p:spPr>
           <a:xfrm>
-            <a:off x="519546" y="531090"/>
-            <a:ext cx="979755" cy="276999"/>
+            <a:off x="446861" y="531090"/>
+            <a:ext cx="1125128" cy="276999"/>
           </a:xfrm>
           <a:prstGeom prst="rect">
             <a:avLst/>
@@ -3189,50 +3189,7 @@
             <a:pPr algn="ctr"/>
             <a:r>
               <a:rPr lang="en-US" sz="1200" dirty="0" err="1" smtClean="0"/>
-              <a:t>MainActivity</a:t>
-            </a:r>
-            <a:endParaRPr lang="en-US" sz="1200" dirty="0"/>
-          </a:p>
-        </p:txBody>
-      </p:sp>
-      <p:sp>
-        <p:nvSpPr>
-          <p:cNvPr id="6" name="Rectangle 5"/>
-          <p:cNvSpPr/>
-          <p:nvPr/>
-        </p:nvSpPr>
-        <p:spPr>
-          <a:xfrm>
-            <a:off x="300181" y="253754"/>
-            <a:ext cx="1420091" cy="277336"/>
-          </a:xfrm>
-          <a:prstGeom prst="rect">
-            <a:avLst/>
-          </a:prstGeom>
-          <a:ln/>
-        </p:spPr>
-        <p:style>
-          <a:lnRef idx="2">
-            <a:schemeClr val="dk1"/>
-          </a:lnRef>
-          <a:fillRef idx="1">
-            <a:schemeClr val="lt1"/>
-          </a:fillRef>
-          <a:effectRef idx="0">
-            <a:schemeClr val="dk1"/>
-          </a:effectRef>
-          <a:fontRef idx="minor">
-            <a:schemeClr val="dk1"/>
-          </a:fontRef>
-        </p:style>
-        <p:txBody>
-          <a:bodyPr rtlCol="0" anchor="ctr"/>
-          <a:lstStyle/>
-          <a:p>
-            <a:pPr algn="ctr"/>
-            <a:r>
-              <a:rPr lang="en-US" sz="1200" dirty="0" smtClean="0"/>
-              <a:t>Main</a:t>
+              <a:t>ViewController</a:t>
             </a:r>
             <a:endParaRPr lang="en-US" sz="1200" dirty="0"/>
           </a:p>
@@ -3246,8 +3203,8 @@
         </p:nvSpPr>
         <p:spPr>
           <a:xfrm>
-            <a:off x="891311" y="1560944"/>
-            <a:ext cx="736099" cy="276999"/>
+            <a:off x="787630" y="1975411"/>
+            <a:ext cx="569387" cy="276999"/>
           </a:xfrm>
           <a:prstGeom prst="rect">
             <a:avLst/>
@@ -3262,49 +3219,6 @@
           <a:p>
             <a:pPr algn="ctr"/>
             <a:r>
-              <a:rPr lang="en-US" sz="1200" dirty="0" err="1" smtClean="0"/>
-              <a:t>A_About</a:t>
-            </a:r>
-            <a:endParaRPr lang="en-US" sz="1200" dirty="0"/>
-          </a:p>
-        </p:txBody>
-      </p:sp>
-      <p:sp>
-        <p:nvSpPr>
-          <p:cNvPr id="8" name="Rectangle 7"/>
-          <p:cNvSpPr/>
-          <p:nvPr/>
-        </p:nvSpPr>
-        <p:spPr>
-          <a:xfrm>
-            <a:off x="671946" y="1283608"/>
-            <a:ext cx="1420091" cy="277336"/>
-          </a:xfrm>
-          <a:prstGeom prst="rect">
-            <a:avLst/>
-          </a:prstGeom>
-          <a:ln/>
-        </p:spPr>
-        <p:style>
-          <a:lnRef idx="2">
-            <a:schemeClr val="dk1"/>
-          </a:lnRef>
-          <a:fillRef idx="1">
-            <a:schemeClr val="lt1"/>
-          </a:fillRef>
-          <a:effectRef idx="0">
-            <a:schemeClr val="dk1"/>
-          </a:effectRef>
-          <a:fontRef idx="minor">
-            <a:schemeClr val="dk1"/>
-          </a:fontRef>
-        </p:style>
-        <p:txBody>
-          <a:bodyPr rtlCol="0" anchor="ctr"/>
-          <a:lstStyle/>
-          <a:p>
-            <a:pPr algn="ctr"/>
-            <a:r>
               <a:rPr lang="en-US" sz="1200" dirty="0" smtClean="0"/>
               <a:t>About</a:t>
             </a:r>
@@ -3320,8 +3234,8 @@
         </p:nvSpPr>
         <p:spPr>
           <a:xfrm>
-            <a:off x="894324" y="2729466"/>
-            <a:ext cx="1105065" cy="276999"/>
+            <a:off x="1098043" y="2729466"/>
+            <a:ext cx="697627" cy="276999"/>
           </a:xfrm>
           <a:prstGeom prst="rect">
             <a:avLst/>
@@ -3336,51 +3250,8 @@
           <a:p>
             <a:pPr algn="ctr"/>
             <a:r>
-              <a:rPr lang="en-US" sz="1200" dirty="0" err="1" smtClean="0"/>
-              <a:t>A_Registration</a:t>
-            </a:r>
-            <a:endParaRPr lang="en-US" sz="1200" dirty="0"/>
-          </a:p>
-        </p:txBody>
-      </p:sp>
-      <p:sp>
-        <p:nvSpPr>
-          <p:cNvPr id="10" name="Rectangle 9"/>
-          <p:cNvSpPr/>
-          <p:nvPr/>
-        </p:nvSpPr>
-        <p:spPr>
-          <a:xfrm>
-            <a:off x="674959" y="2452130"/>
-            <a:ext cx="1420091" cy="277336"/>
-          </a:xfrm>
-          <a:prstGeom prst="rect">
-            <a:avLst/>
-          </a:prstGeom>
-          <a:ln/>
-        </p:spPr>
-        <p:style>
-          <a:lnRef idx="2">
-            <a:schemeClr val="dk1"/>
-          </a:lnRef>
-          <a:fillRef idx="1">
-            <a:schemeClr val="lt1"/>
-          </a:fillRef>
-          <a:effectRef idx="0">
-            <a:schemeClr val="dk1"/>
-          </a:effectRef>
-          <a:fontRef idx="minor">
-            <a:schemeClr val="dk1"/>
-          </a:fontRef>
-        </p:style>
-        <p:txBody>
-          <a:bodyPr rtlCol="0" anchor="ctr"/>
-          <a:lstStyle/>
-          <a:p>
-            <a:pPr algn="ctr"/>
-            <a:r>
               <a:rPr lang="en-US" sz="1200" dirty="0" smtClean="0"/>
-              <a:t>Registration</a:t>
+              <a:t>Register</a:t>
             </a:r>
             <a:endParaRPr lang="en-US" sz="1200" dirty="0"/>
           </a:p>
@@ -3397,13 +3268,13 @@
         </p:nvCxnSpPr>
         <p:spPr>
           <a:xfrm rot="5400000">
-            <a:off x="533592" y="946443"/>
-            <a:ext cx="614187" cy="337478"/>
+            <a:off x="232840" y="1060158"/>
+            <a:ext cx="1028654" cy="524516"/>
           </a:xfrm>
           <a:prstGeom prst="curvedConnector4">
             <a:avLst>
-              <a:gd name="adj1" fmla="val 38711"/>
-              <a:gd name="adj2" fmla="val 167738"/>
+              <a:gd name="adj1" fmla="val 43260"/>
+              <a:gd name="adj2" fmla="val 136979"/>
             </a:avLst>
           </a:prstGeom>
           <a:ln w="19050" cmpd="sng">
@@ -3436,13 +3307,13 @@
         </p:nvCxnSpPr>
         <p:spPr>
           <a:xfrm rot="5400000">
-            <a:off x="-49162" y="1532211"/>
-            <a:ext cx="1782709" cy="334465"/>
+            <a:off x="-49162" y="1532210"/>
+            <a:ext cx="1782709" cy="334466"/>
           </a:xfrm>
           <a:prstGeom prst="curvedConnector4">
             <a:avLst>
-              <a:gd name="adj1" fmla="val 11786"/>
-              <a:gd name="adj2" fmla="val 206319"/>
+              <a:gd name="adj1" fmla="val 46111"/>
+              <a:gd name="adj2" fmla="val 168348"/>
             </a:avLst>
           </a:prstGeom>
           <a:ln w="19050" cmpd="sng">
@@ -3472,8 +3343,8 @@
         </p:nvSpPr>
         <p:spPr>
           <a:xfrm>
-            <a:off x="2288308" y="567696"/>
-            <a:ext cx="1441420" cy="276999"/>
+            <a:off x="2358842" y="567696"/>
+            <a:ext cx="1300356" cy="276999"/>
           </a:xfrm>
           <a:prstGeom prst="rect">
             <a:avLst/>
@@ -3489,49 +3360,6 @@
             <a:pPr algn="ctr"/>
             <a:r>
               <a:rPr lang="en-US" sz="1200" dirty="0" err="1" smtClean="0"/>
-              <a:t>A_VolunteerActivity</a:t>
-            </a:r>
-            <a:endParaRPr lang="en-US" sz="1200" dirty="0"/>
-          </a:p>
-        </p:txBody>
-      </p:sp>
-      <p:sp>
-        <p:nvSpPr>
-          <p:cNvPr id="19" name="Rectangle 18"/>
-          <p:cNvSpPr/>
-          <p:nvPr/>
-        </p:nvSpPr>
-        <p:spPr>
-          <a:xfrm>
-            <a:off x="2288308" y="278908"/>
-            <a:ext cx="1420091" cy="277336"/>
-          </a:xfrm>
-          <a:prstGeom prst="rect">
-            <a:avLst/>
-          </a:prstGeom>
-          <a:ln/>
-        </p:spPr>
-        <p:style>
-          <a:lnRef idx="2">
-            <a:schemeClr val="dk1"/>
-          </a:lnRef>
-          <a:fillRef idx="1">
-            <a:schemeClr val="lt1"/>
-          </a:fillRef>
-          <a:effectRef idx="0">
-            <a:schemeClr val="dk1"/>
-          </a:effectRef>
-          <a:fontRef idx="minor">
-            <a:schemeClr val="dk1"/>
-          </a:fontRef>
-        </p:style>
-        <p:txBody>
-          <a:bodyPr rtlCol="0" anchor="ctr"/>
-          <a:lstStyle/>
-          <a:p>
-            <a:pPr algn="ctr"/>
-            <a:r>
-              <a:rPr lang="en-US" sz="1200" dirty="0" err="1" smtClean="0"/>
               <a:t>VolunteerOptions</a:t>
             </a:r>
             <a:endParaRPr lang="en-US" sz="1200" dirty="0"/>
@@ -3546,8 +3374,8 @@
         </p:nvSpPr>
         <p:spPr>
           <a:xfrm>
-            <a:off x="4364889" y="581428"/>
-            <a:ext cx="1056700" cy="276999"/>
+            <a:off x="4448245" y="581428"/>
+            <a:ext cx="889987" cy="276999"/>
           </a:xfrm>
           <a:prstGeom prst="rect">
             <a:avLst/>
@@ -3563,49 +3391,6 @@
             <a:pPr algn="ctr"/>
             <a:r>
               <a:rPr lang="en-US" sz="1200" dirty="0" err="1" smtClean="0"/>
-              <a:t>A_MySignUps</a:t>
-            </a:r>
-            <a:endParaRPr lang="en-US" sz="1200" dirty="0"/>
-          </a:p>
-        </p:txBody>
-      </p:sp>
-      <p:sp>
-        <p:nvSpPr>
-          <p:cNvPr id="21" name="Rectangle 20"/>
-          <p:cNvSpPr/>
-          <p:nvPr/>
-        </p:nvSpPr>
-        <p:spPr>
-          <a:xfrm>
-            <a:off x="4172526" y="292640"/>
-            <a:ext cx="1420091" cy="277336"/>
-          </a:xfrm>
-          <a:prstGeom prst="rect">
-            <a:avLst/>
-          </a:prstGeom>
-          <a:ln/>
-        </p:spPr>
-        <p:style>
-          <a:lnRef idx="2">
-            <a:schemeClr val="dk1"/>
-          </a:lnRef>
-          <a:fillRef idx="1">
-            <a:schemeClr val="lt1"/>
-          </a:fillRef>
-          <a:effectRef idx="0">
-            <a:schemeClr val="dk1"/>
-          </a:effectRef>
-          <a:fontRef idx="minor">
-            <a:schemeClr val="dk1"/>
-          </a:fontRef>
-        </p:style>
-        <p:txBody>
-          <a:bodyPr rtlCol="0" anchor="ctr"/>
-          <a:lstStyle/>
-          <a:p>
-            <a:pPr algn="ctr"/>
-            <a:r>
-              <a:rPr lang="en-US" sz="1200" dirty="0" err="1" smtClean="0"/>
               <a:t>MySignUps</a:t>
             </a:r>
             <a:endParaRPr lang="en-US" sz="1200" dirty="0"/>
@@ -3620,7 +3405,7 @@
         </p:nvSpPr>
         <p:spPr>
           <a:xfrm>
-            <a:off x="5943896" y="595160"/>
+            <a:off x="7423462" y="551040"/>
             <a:ext cx="1574770" cy="276999"/>
           </a:xfrm>
           <a:prstGeom prst="rect">
@@ -3638,49 +3423,6 @@
             <a:r>
               <a:rPr lang="en-US" sz="1200" dirty="0" err="1" smtClean="0"/>
               <a:t>A_ViewSignUpExisting</a:t>
-            </a:r>
-            <a:endParaRPr lang="en-US" sz="1200" dirty="0"/>
-          </a:p>
-        </p:txBody>
-      </p:sp>
-      <p:sp>
-        <p:nvSpPr>
-          <p:cNvPr id="23" name="Rectangle 22"/>
-          <p:cNvSpPr/>
-          <p:nvPr/>
-        </p:nvSpPr>
-        <p:spPr>
-          <a:xfrm>
-            <a:off x="6010563" y="306372"/>
-            <a:ext cx="1420091" cy="277336"/>
-          </a:xfrm>
-          <a:prstGeom prst="rect">
-            <a:avLst/>
-          </a:prstGeom>
-          <a:ln/>
-        </p:spPr>
-        <p:style>
-          <a:lnRef idx="2">
-            <a:schemeClr val="dk1"/>
-          </a:lnRef>
-          <a:fillRef idx="1">
-            <a:schemeClr val="lt1"/>
-          </a:fillRef>
-          <a:effectRef idx="0">
-            <a:schemeClr val="dk1"/>
-          </a:effectRef>
-          <a:fontRef idx="minor">
-            <a:schemeClr val="dk1"/>
-          </a:fontRef>
-        </p:style>
-        <p:txBody>
-          <a:bodyPr rtlCol="0" anchor="ctr"/>
-          <a:lstStyle/>
-          <a:p>
-            <a:pPr algn="ctr"/>
-            <a:r>
-              <a:rPr lang="en-US" sz="1200" dirty="0" err="1" smtClean="0"/>
-              <a:t>ViewSignUpExisting</a:t>
             </a:r>
             <a:endParaRPr lang="en-US" sz="1200" dirty="0"/>
           </a:p>
@@ -3768,9 +3510,9 @@
           <p:nvPr/>
         </p:nvCxnSpPr>
         <p:spPr>
-          <a:xfrm>
-            <a:off x="5592617" y="431308"/>
-            <a:ext cx="417946" cy="13732"/>
+          <a:xfrm flipV="1">
+            <a:off x="5592617" y="392422"/>
+            <a:ext cx="1890320" cy="38886"/>
           </a:xfrm>
           <a:prstGeom prst="curvedConnector3">
             <a:avLst/>
@@ -3802,8 +3544,8 @@
         </p:nvSpPr>
         <p:spPr>
           <a:xfrm>
-            <a:off x="3904336" y="2188491"/>
-            <a:ext cx="1095172" cy="276999"/>
+            <a:off x="2578219" y="2213675"/>
+            <a:ext cx="928459" cy="276999"/>
           </a:xfrm>
           <a:prstGeom prst="rect">
             <a:avLst/>
@@ -3818,49 +3560,6 @@
           <a:p>
             <a:pPr algn="ctr"/>
             <a:r>
-              <a:rPr lang="en-US" sz="1200" dirty="0" err="1" smtClean="0"/>
-              <a:t>A_Suggestions</a:t>
-            </a:r>
-            <a:endParaRPr lang="en-US" sz="1200" dirty="0"/>
-          </a:p>
-        </p:txBody>
-      </p:sp>
-      <p:sp>
-        <p:nvSpPr>
-          <p:cNvPr id="33" name="Rectangle 32"/>
-          <p:cNvSpPr/>
-          <p:nvPr/>
-        </p:nvSpPr>
-        <p:spPr>
-          <a:xfrm>
-            <a:off x="3731210" y="1899703"/>
-            <a:ext cx="1420091" cy="277336"/>
-          </a:xfrm>
-          <a:prstGeom prst="rect">
-            <a:avLst/>
-          </a:prstGeom>
-          <a:ln/>
-        </p:spPr>
-        <p:style>
-          <a:lnRef idx="2">
-            <a:schemeClr val="dk1"/>
-          </a:lnRef>
-          <a:fillRef idx="1">
-            <a:schemeClr val="lt1"/>
-          </a:fillRef>
-          <a:effectRef idx="0">
-            <a:schemeClr val="dk1"/>
-          </a:effectRef>
-          <a:fontRef idx="minor">
-            <a:schemeClr val="dk1"/>
-          </a:fontRef>
-        </p:style>
-        <p:txBody>
-          <a:bodyPr rtlCol="0" anchor="ctr"/>
-          <a:lstStyle/>
-          <a:p>
-            <a:pPr algn="ctr"/>
-            <a:r>
               <a:rPr lang="en-US" sz="1200" dirty="0" smtClean="0"/>
               <a:t>Suggestions</a:t>
             </a:r>
@@ -3876,8 +3575,8 @@
         </p:nvSpPr>
         <p:spPr>
           <a:xfrm>
-            <a:off x="5820503" y="2202223"/>
-            <a:ext cx="1031277" cy="276999"/>
+            <a:off x="4299480" y="2225127"/>
+            <a:ext cx="865592" cy="276999"/>
           </a:xfrm>
           <a:prstGeom prst="rect">
             <a:avLst/>
@@ -3888,49 +3587,6 @@
           <a:bodyPr wrap="none" rtlCol="0">
             <a:spAutoFit/>
           </a:bodyPr>
-          <a:lstStyle/>
-          <a:p>
-            <a:pPr algn="ctr"/>
-            <a:r>
-              <a:rPr lang="en-US" sz="1200" dirty="0" err="1" smtClean="0"/>
-              <a:t>A_Suggestion</a:t>
-            </a:r>
-            <a:endParaRPr lang="en-US" sz="1200" dirty="0"/>
-          </a:p>
-        </p:txBody>
-      </p:sp>
-      <p:sp>
-        <p:nvSpPr>
-          <p:cNvPr id="35" name="Rectangle 34"/>
-          <p:cNvSpPr/>
-          <p:nvPr/>
-        </p:nvSpPr>
-        <p:spPr>
-          <a:xfrm>
-            <a:off x="5615428" y="1913435"/>
-            <a:ext cx="1420091" cy="277336"/>
-          </a:xfrm>
-          <a:prstGeom prst="rect">
-            <a:avLst/>
-          </a:prstGeom>
-          <a:ln/>
-        </p:spPr>
-        <p:style>
-          <a:lnRef idx="2">
-            <a:schemeClr val="dk1"/>
-          </a:lnRef>
-          <a:fillRef idx="1">
-            <a:schemeClr val="lt1"/>
-          </a:fillRef>
-          <a:effectRef idx="0">
-            <a:schemeClr val="dk1"/>
-          </a:effectRef>
-          <a:fontRef idx="minor">
-            <a:schemeClr val="dk1"/>
-          </a:fontRef>
-        </p:style>
-        <p:txBody>
-          <a:bodyPr rtlCol="0" anchor="ctr"/>
           <a:lstStyle/>
           <a:p>
             <a:pPr algn="ctr"/>
@@ -3953,8 +3609,8 @@
         </p:nvCxnSpPr>
         <p:spPr>
           <a:xfrm>
-            <a:off x="5151301" y="2038371"/>
-            <a:ext cx="464127" cy="13732"/>
+            <a:off x="3741825" y="2063555"/>
+            <a:ext cx="269738" cy="11452"/>
           </a:xfrm>
           <a:prstGeom prst="curvedConnector3">
             <a:avLst/>
@@ -3988,12 +3644,15 @@
           <p:nvPr/>
         </p:nvCxnSpPr>
         <p:spPr>
-          <a:xfrm rot="16200000" flipH="1">
-            <a:off x="2773276" y="1080437"/>
-            <a:ext cx="1193676" cy="722192"/>
-          </a:xfrm>
-          <a:prstGeom prst="curvedConnector2">
-            <a:avLst/>
+          <a:xfrm rot="5400000">
+            <a:off x="2055947" y="1110482"/>
+            <a:ext cx="1218860" cy="687286"/>
+          </a:xfrm>
+          <a:prstGeom prst="curvedConnector4">
+            <a:avLst>
+              <a:gd name="adj1" fmla="val 44312"/>
+              <a:gd name="adj2" fmla="val 133261"/>
+            </a:avLst>
           </a:prstGeom>
           <a:ln w="19050" cmpd="sng">
             <a:tailEnd type="arrow"/>
@@ -4022,8 +3681,8 @@
         </p:nvSpPr>
         <p:spPr>
           <a:xfrm>
-            <a:off x="3907114" y="1419996"/>
-            <a:ext cx="1110851" cy="276999"/>
+            <a:off x="2589540" y="1418677"/>
+            <a:ext cx="741384" cy="276999"/>
           </a:xfrm>
           <a:prstGeom prst="rect">
             <a:avLst/>
@@ -4038,51 +3697,8 @@
           <a:p>
             <a:pPr algn="ctr"/>
             <a:r>
-              <a:rPr lang="en-US" sz="1200" dirty="0" err="1" smtClean="0"/>
-              <a:t>A_VolCalendar</a:t>
-            </a:r>
-            <a:endParaRPr lang="en-US" sz="1200" dirty="0"/>
-          </a:p>
-        </p:txBody>
-      </p:sp>
-      <p:sp>
-        <p:nvSpPr>
-          <p:cNvPr id="44" name="Rectangle 43"/>
-          <p:cNvSpPr/>
-          <p:nvPr/>
-        </p:nvSpPr>
-        <p:spPr>
-          <a:xfrm>
-            <a:off x="3741825" y="1131208"/>
-            <a:ext cx="1420091" cy="277336"/>
-          </a:xfrm>
-          <a:prstGeom prst="rect">
-            <a:avLst/>
-          </a:prstGeom>
-          <a:ln/>
-        </p:spPr>
-        <p:style>
-          <a:lnRef idx="2">
-            <a:schemeClr val="dk1"/>
-          </a:lnRef>
-          <a:fillRef idx="1">
-            <a:schemeClr val="lt1"/>
-          </a:fillRef>
-          <a:effectRef idx="0">
-            <a:schemeClr val="dk1"/>
-          </a:effectRef>
-          <a:fontRef idx="minor">
-            <a:schemeClr val="dk1"/>
-          </a:fontRef>
-        </p:style>
-        <p:txBody>
-          <a:bodyPr rtlCol="0" anchor="ctr"/>
-          <a:lstStyle/>
-          <a:p>
-            <a:pPr algn="ctr"/>
-            <a:r>
-              <a:rPr lang="en-US" sz="1200" dirty="0" err="1" smtClean="0"/>
-              <a:t>VolCalendar</a:t>
+              <a:rPr lang="en-US" sz="1200" dirty="0" smtClean="0"/>
+              <a:t>Calendar</a:t>
             </a:r>
             <a:endParaRPr lang="en-US" sz="1200" dirty="0"/>
           </a:p>
@@ -4096,8 +3712,8 @@
         </p:nvSpPr>
         <p:spPr>
           <a:xfrm>
-            <a:off x="5824820" y="1433728"/>
-            <a:ext cx="1043876" cy="276999"/>
+            <a:off x="4076662" y="1418799"/>
+            <a:ext cx="1172116" cy="276999"/>
           </a:xfrm>
           <a:prstGeom prst="rect">
             <a:avLst/>
@@ -4113,50 +3729,7 @@
             <a:pPr algn="ctr"/>
             <a:r>
               <a:rPr lang="en-US" sz="1200" dirty="0" err="1" smtClean="0"/>
-              <a:t>A_VolPickSite</a:t>
-            </a:r>
-            <a:endParaRPr lang="en-US" sz="1200" dirty="0"/>
-          </a:p>
-        </p:txBody>
-      </p:sp>
-      <p:sp>
-        <p:nvSpPr>
-          <p:cNvPr id="46" name="Rectangle 45"/>
-          <p:cNvSpPr/>
-          <p:nvPr/>
-        </p:nvSpPr>
-        <p:spPr>
-          <a:xfrm>
-            <a:off x="5626043" y="1144940"/>
-            <a:ext cx="1420091" cy="277336"/>
-          </a:xfrm>
-          <a:prstGeom prst="rect">
-            <a:avLst/>
-          </a:prstGeom>
-          <a:ln/>
-        </p:spPr>
-        <p:style>
-          <a:lnRef idx="2">
-            <a:schemeClr val="dk1"/>
-          </a:lnRef>
-          <a:fillRef idx="1">
-            <a:schemeClr val="lt1"/>
-          </a:fillRef>
-          <a:effectRef idx="0">
-            <a:schemeClr val="dk1"/>
-          </a:effectRef>
-          <a:fontRef idx="minor">
-            <a:schemeClr val="dk1"/>
-          </a:fontRef>
-        </p:style>
-        <p:txBody>
-          <a:bodyPr rtlCol="0" anchor="ctr"/>
-          <a:lstStyle/>
-          <a:p>
-            <a:pPr algn="ctr"/>
-            <a:r>
-              <a:rPr lang="en-US" sz="1200" dirty="0" err="1" smtClean="0"/>
-              <a:t>VolPickSite</a:t>
+              <a:t>SitesOnDateList</a:t>
             </a:r>
             <a:endParaRPr lang="en-US" sz="1200" dirty="0"/>
           </a:p>
@@ -4173,8 +3746,8 @@
         </p:nvCxnSpPr>
         <p:spPr>
           <a:xfrm>
-            <a:off x="5161916" y="1269876"/>
-            <a:ext cx="464127" cy="13732"/>
+            <a:off x="3659609" y="1268557"/>
+            <a:ext cx="282393" cy="122"/>
           </a:xfrm>
           <a:prstGeom prst="curvedConnector3">
             <a:avLst/>
@@ -4206,8 +3779,8 @@
         </p:nvSpPr>
         <p:spPr>
           <a:xfrm>
-            <a:off x="7518665" y="1430588"/>
-            <a:ext cx="1384363" cy="276999"/>
+            <a:off x="7987079" y="1420121"/>
+            <a:ext cx="623563" cy="276999"/>
           </a:xfrm>
           <a:prstGeom prst="rect">
             <a:avLst/>
@@ -4223,50 +3796,7 @@
             <a:pPr algn="ctr"/>
             <a:r>
               <a:rPr lang="en-US" sz="1200" dirty="0" err="1" smtClean="0"/>
-              <a:t>A_ViewSignUpNew</a:t>
-            </a:r>
-            <a:endParaRPr lang="en-US" sz="1200" dirty="0"/>
-          </a:p>
-        </p:txBody>
-      </p:sp>
-      <p:sp>
-        <p:nvSpPr>
-          <p:cNvPr id="49" name="Rectangle 48"/>
-          <p:cNvSpPr/>
-          <p:nvPr/>
-        </p:nvSpPr>
-        <p:spPr>
-          <a:xfrm>
-            <a:off x="7490129" y="1141800"/>
-            <a:ext cx="1420091" cy="277336"/>
-          </a:xfrm>
-          <a:prstGeom prst="rect">
-            <a:avLst/>
-          </a:prstGeom>
-          <a:ln/>
-        </p:spPr>
-        <p:style>
-          <a:lnRef idx="2">
-            <a:schemeClr val="dk1"/>
-          </a:lnRef>
-          <a:fillRef idx="1">
-            <a:schemeClr val="lt1"/>
-          </a:fillRef>
-          <a:effectRef idx="0">
-            <a:schemeClr val="dk1"/>
-          </a:effectRef>
-          <a:fontRef idx="minor">
-            <a:schemeClr val="dk1"/>
-          </a:fontRef>
-        </p:style>
-        <p:txBody>
-          <a:bodyPr rtlCol="0" anchor="ctr"/>
-          <a:lstStyle/>
-          <a:p>
-            <a:pPr algn="ctr"/>
-            <a:r>
-              <a:rPr lang="en-US" sz="1200" dirty="0" err="1" smtClean="0"/>
-              <a:t>ViewSignUpNew</a:t>
+              <a:t>SignUp</a:t>
             </a:r>
             <a:endParaRPr lang="en-US" sz="1200" dirty="0"/>
           </a:p>
@@ -4277,14 +3807,14 @@
           <p:cNvPr id="50" name="Curved Connector 49"/>
           <p:cNvCxnSpPr>
             <a:stCxn id="46" idx="3"/>
-            <a:endCxn id="49" idx="1"/>
+            <a:endCxn id="85" idx="1"/>
           </p:cNvCxnSpPr>
           <p:nvPr/>
         </p:nvCxnSpPr>
         <p:spPr>
-          <a:xfrm flipV="1">
-            <a:off x="7046134" y="1280468"/>
-            <a:ext cx="443995" cy="3140"/>
+          <a:xfrm>
+            <a:off x="5362093" y="1268679"/>
+            <a:ext cx="381672" cy="1200"/>
           </a:xfrm>
           <a:prstGeom prst="curvedConnector3">
             <a:avLst>
@@ -4320,12 +3850,15 @@
           <p:nvPr/>
         </p:nvCxnSpPr>
         <p:spPr>
-          <a:xfrm rot="16200000" flipH="1">
-            <a:off x="3162831" y="690881"/>
-            <a:ext cx="425181" cy="732807"/>
-          </a:xfrm>
-          <a:prstGeom prst="curvedConnector2">
-            <a:avLst/>
+          <a:xfrm rot="5400000">
+            <a:off x="2412338" y="671875"/>
+            <a:ext cx="423862" cy="769502"/>
+          </a:xfrm>
+          <a:prstGeom prst="curvedConnector4">
+            <a:avLst>
+              <a:gd name="adj1" fmla="val 33642"/>
+              <a:gd name="adj2" fmla="val 129708"/>
+            </a:avLst>
           </a:prstGeom>
           <a:ln w="19050" cmpd="sng">
             <a:tailEnd type="arrow"/>
@@ -4357,12 +3890,12 @@
         </p:nvCxnSpPr>
         <p:spPr>
           <a:xfrm rot="16200000" flipH="1">
-            <a:off x="4132876" y="-279163"/>
-            <a:ext cx="1068740" cy="3316456"/>
+            <a:off x="3319492" y="534222"/>
+            <a:ext cx="1091644" cy="1712589"/>
           </a:xfrm>
           <a:prstGeom prst="curvedConnector3">
             <a:avLst>
-              <a:gd name="adj1" fmla="val 88890"/>
+              <a:gd name="adj1" fmla="val 50000"/>
             </a:avLst>
           </a:prstGeom>
           <a:ln w="19050" cmpd="sng">
@@ -4392,8 +3925,8 @@
         </p:nvSpPr>
         <p:spPr>
           <a:xfrm>
-            <a:off x="4081665" y="2879586"/>
-            <a:ext cx="761747" cy="276999"/>
+            <a:off x="2622683" y="2864936"/>
+            <a:ext cx="1056700" cy="276999"/>
           </a:xfrm>
           <a:prstGeom prst="rect">
             <a:avLst/>
@@ -4409,7 +3942,7 @@
             <a:pPr algn="ctr"/>
             <a:r>
               <a:rPr lang="en-US" sz="1200" dirty="0" err="1" smtClean="0"/>
-              <a:t>A_Profile</a:t>
+              <a:t>UpdateProfile</a:t>
             </a:r>
             <a:endParaRPr lang="en-US" sz="1200" dirty="0"/>
           </a:p>
@@ -4423,7 +3956,7 @@
         </p:nvSpPr>
         <p:spPr>
           <a:xfrm>
-            <a:off x="3741825" y="2590798"/>
+            <a:off x="2430317" y="2576148"/>
             <a:ext cx="1420091" cy="277336"/>
           </a:xfrm>
           <a:prstGeom prst="rect">
@@ -4468,12 +4001,15 @@
           <p:nvPr/>
         </p:nvCxnSpPr>
         <p:spPr>
-          <a:xfrm rot="16200000" flipH="1">
-            <a:off x="2433036" y="1420676"/>
-            <a:ext cx="1884771" cy="732807"/>
-          </a:xfrm>
-          <a:prstGeom prst="curvedConnector2">
-            <a:avLst/>
+          <a:xfrm rot="5400000">
+            <a:off x="1784609" y="1490404"/>
+            <a:ext cx="1870121" cy="578703"/>
+          </a:xfrm>
+          <a:prstGeom prst="curvedConnector4">
+            <a:avLst>
+              <a:gd name="adj1" fmla="val 46293"/>
+              <a:gd name="adj2" fmla="val 139502"/>
+            </a:avLst>
           </a:prstGeom>
           <a:ln w="19050" cmpd="sng">
             <a:tailEnd type="arrow"/>
@@ -4502,8 +4038,8 @@
         </p:nvSpPr>
         <p:spPr>
           <a:xfrm>
-            <a:off x="1024500" y="3574348"/>
-            <a:ext cx="838691" cy="276999"/>
+            <a:off x="1127094" y="3574348"/>
+            <a:ext cx="633507" cy="276999"/>
           </a:xfrm>
           <a:prstGeom prst="rect">
             <a:avLst/>
@@ -4519,52 +4055,9 @@
             <a:pPr algn="ctr"/>
             <a:r>
               <a:rPr lang="en-US" sz="1200" dirty="0" err="1" smtClean="0"/>
-              <a:t>SCMySites</a:t>
+              <a:t>SCSites</a:t>
             </a:r>
             <a:endParaRPr lang="en-US" sz="1200" dirty="0" smtClean="0"/>
-          </a:p>
-        </p:txBody>
-      </p:sp>
-      <p:sp>
-        <p:nvSpPr>
-          <p:cNvPr id="72" name="Rectangle 71"/>
-          <p:cNvSpPr/>
-          <p:nvPr/>
-        </p:nvSpPr>
-        <p:spPr>
-          <a:xfrm>
-            <a:off x="671946" y="3297012"/>
-            <a:ext cx="1420091" cy="277336"/>
-          </a:xfrm>
-          <a:prstGeom prst="rect">
-            <a:avLst/>
-          </a:prstGeom>
-          <a:ln/>
-        </p:spPr>
-        <p:style>
-          <a:lnRef idx="2">
-            <a:schemeClr val="dk1"/>
-          </a:lnRef>
-          <a:fillRef idx="1">
-            <a:schemeClr val="lt1"/>
-          </a:fillRef>
-          <a:effectRef idx="0">
-            <a:schemeClr val="dk1"/>
-          </a:effectRef>
-          <a:fontRef idx="minor">
-            <a:schemeClr val="dk1"/>
-          </a:fontRef>
-        </p:style>
-        <p:txBody>
-          <a:bodyPr rtlCol="0" anchor="ctr"/>
-          <a:lstStyle/>
-          <a:p>
-            <a:pPr algn="ctr"/>
-            <a:r>
-              <a:rPr lang="en-US" sz="1200" dirty="0" err="1" smtClean="0"/>
-              <a:t>SCMySites</a:t>
-            </a:r>
-            <a:endParaRPr lang="en-US" sz="1200" dirty="0"/>
           </a:p>
         </p:txBody>
       </p:sp>
@@ -4576,8 +4069,8 @@
         </p:nvSpPr>
         <p:spPr>
           <a:xfrm>
-            <a:off x="1556417" y="4700597"/>
-            <a:ext cx="737251" cy="276999"/>
+            <a:off x="1320439" y="4700597"/>
+            <a:ext cx="571566" cy="276999"/>
           </a:xfrm>
           <a:prstGeom prst="rect">
             <a:avLst/>
@@ -4588,49 +4081,6 @@
           <a:bodyPr wrap="none" rtlCol="0">
             <a:spAutoFit/>
           </a:bodyPr>
-          <a:lstStyle/>
-          <a:p>
-            <a:pPr algn="ctr"/>
-            <a:r>
-              <a:rPr lang="en-US" sz="1200" dirty="0" err="1" smtClean="0"/>
-              <a:t>A_SCSite</a:t>
-            </a:r>
-            <a:endParaRPr lang="en-US" sz="1200" dirty="0"/>
-          </a:p>
-        </p:txBody>
-      </p:sp>
-      <p:sp>
-        <p:nvSpPr>
-          <p:cNvPr id="74" name="Rectangle 73"/>
-          <p:cNvSpPr/>
-          <p:nvPr/>
-        </p:nvSpPr>
-        <p:spPr>
-          <a:xfrm>
-            <a:off x="1153145" y="4423261"/>
-            <a:ext cx="1420091" cy="277336"/>
-          </a:xfrm>
-          <a:prstGeom prst="rect">
-            <a:avLst/>
-          </a:prstGeom>
-          <a:ln/>
-        </p:spPr>
-        <p:style>
-          <a:lnRef idx="2">
-            <a:schemeClr val="dk1"/>
-          </a:lnRef>
-          <a:fillRef idx="1">
-            <a:schemeClr val="lt1"/>
-          </a:fillRef>
-          <a:effectRef idx="0">
-            <a:schemeClr val="dk1"/>
-          </a:effectRef>
-          <a:fontRef idx="minor">
-            <a:schemeClr val="dk1"/>
-          </a:fontRef>
-        </p:style>
-        <p:txBody>
-          <a:bodyPr rtlCol="0" anchor="ctr"/>
           <a:lstStyle/>
           <a:p>
             <a:pPr algn="ctr"/>
@@ -4653,13 +4103,13 @@
         </p:nvCxnSpPr>
         <p:spPr>
           <a:xfrm rot="5400000">
-            <a:off x="-473110" y="1953145"/>
-            <a:ext cx="2627591" cy="337478"/>
+            <a:off x="-473109" y="1953145"/>
+            <a:ext cx="2627591" cy="337479"/>
           </a:xfrm>
           <a:prstGeom prst="curvedConnector4">
             <a:avLst>
-              <a:gd name="adj1" fmla="val 7376"/>
-              <a:gd name="adj2" fmla="val 208791"/>
+              <a:gd name="adj1" fmla="val 47361"/>
+              <a:gd name="adj2" fmla="val 167738"/>
             </a:avLst>
           </a:prstGeom>
           <a:ln w="19050" cmpd="sng">
@@ -4691,8 +4141,8 @@
         </p:nvCxnSpPr>
         <p:spPr>
           <a:xfrm rot="16200000" flipH="1">
-            <a:off x="-380588" y="3028195"/>
-            <a:ext cx="2214503" cy="852964"/>
+            <a:off x="-1003652" y="2723952"/>
+            <a:ext cx="3141808" cy="534145"/>
           </a:xfrm>
           <a:prstGeom prst="curvedConnector2">
             <a:avLst/>
@@ -4727,13 +4177,13 @@
         </p:nvCxnSpPr>
         <p:spPr>
           <a:xfrm rot="5400000">
-            <a:off x="943205" y="4061288"/>
-            <a:ext cx="710582" cy="290701"/>
+            <a:off x="783796" y="3901877"/>
+            <a:ext cx="710582" cy="609523"/>
           </a:xfrm>
           <a:prstGeom prst="curvedConnector4">
             <a:avLst>
               <a:gd name="adj1" fmla="val 40243"/>
-              <a:gd name="adj2" fmla="val 178638"/>
+              <a:gd name="adj2" fmla="val 137505"/>
             </a:avLst>
           </a:prstGeom>
           <a:ln w="19050" cmpd="sng">
@@ -4763,8 +4213,8 @@
         </p:nvSpPr>
         <p:spPr>
           <a:xfrm>
-            <a:off x="5663474" y="3990015"/>
-            <a:ext cx="941033" cy="276999"/>
+            <a:off x="6134164" y="3941894"/>
+            <a:ext cx="1031051" cy="276999"/>
           </a:xfrm>
           <a:prstGeom prst="rect">
             <a:avLst/>
@@ -4780,50 +4230,7 @@
             <a:pPr algn="ctr"/>
             <a:r>
               <a:rPr lang="en-US" sz="1200" dirty="0" err="1" smtClean="0"/>
-              <a:t>A_SCSiteVol</a:t>
-            </a:r>
-            <a:endParaRPr lang="en-US" sz="1200" dirty="0"/>
-          </a:p>
-        </p:txBody>
-      </p:sp>
-      <p:sp>
-        <p:nvSpPr>
-          <p:cNvPr id="95" name="Rectangle 94"/>
-          <p:cNvSpPr/>
-          <p:nvPr/>
-        </p:nvSpPr>
-        <p:spPr>
-          <a:xfrm>
-            <a:off x="5362093" y="3712679"/>
-            <a:ext cx="1420091" cy="277336"/>
-          </a:xfrm>
-          <a:prstGeom prst="rect">
-            <a:avLst/>
-          </a:prstGeom>
-          <a:ln/>
-        </p:spPr>
-        <p:style>
-          <a:lnRef idx="2">
-            <a:schemeClr val="dk1"/>
-          </a:lnRef>
-          <a:fillRef idx="1">
-            <a:schemeClr val="lt1"/>
-          </a:fillRef>
-          <a:effectRef idx="0">
-            <a:schemeClr val="dk1"/>
-          </a:effectRef>
-          <a:fontRef idx="minor">
-            <a:schemeClr val="dk1"/>
-          </a:fontRef>
-        </p:style>
-        <p:txBody>
-          <a:bodyPr rtlCol="0" anchor="ctr"/>
-          <a:lstStyle/>
-          <a:p>
-            <a:pPr algn="ctr"/>
-            <a:r>
-              <a:rPr lang="en-US" sz="1200" dirty="0" err="1" smtClean="0"/>
-              <a:t>SCSiteVol</a:t>
+              <a:t>SCVolunteers</a:t>
             </a:r>
             <a:endParaRPr lang="en-US" sz="1200" dirty="0"/>
           </a:p>
@@ -4837,8 +4244,8 @@
         </p:nvSpPr>
         <p:spPr>
           <a:xfrm>
-            <a:off x="7528604" y="3990014"/>
-            <a:ext cx="1082348" cy="276999"/>
+            <a:off x="7680628" y="3941894"/>
+            <a:ext cx="1338828" cy="276999"/>
           </a:xfrm>
           <a:prstGeom prst="rect">
             <a:avLst/>
@@ -4854,50 +4261,7 @@
             <a:pPr algn="ctr"/>
             <a:r>
               <a:rPr lang="en-US" sz="1200" dirty="0" err="1" smtClean="0"/>
-              <a:t>A_SCVolHours</a:t>
-            </a:r>
-            <a:endParaRPr lang="en-US" sz="1200" dirty="0"/>
-          </a:p>
-        </p:txBody>
-      </p:sp>
-      <p:sp>
-        <p:nvSpPr>
-          <p:cNvPr id="97" name="Rectangle 96"/>
-          <p:cNvSpPr/>
-          <p:nvPr/>
-        </p:nvSpPr>
-        <p:spPr>
-          <a:xfrm>
-            <a:off x="7297880" y="3712678"/>
-            <a:ext cx="1420091" cy="277336"/>
-          </a:xfrm>
-          <a:prstGeom prst="rect">
-            <a:avLst/>
-          </a:prstGeom>
-          <a:ln/>
-        </p:spPr>
-        <p:style>
-          <a:lnRef idx="2">
-            <a:schemeClr val="dk1"/>
-          </a:lnRef>
-          <a:fillRef idx="1">
-            <a:schemeClr val="lt1"/>
-          </a:fillRef>
-          <a:effectRef idx="0">
-            <a:schemeClr val="dk1"/>
-          </a:effectRef>
-          <a:fontRef idx="minor">
-            <a:schemeClr val="dk1"/>
-          </a:fontRef>
-        </p:style>
-        <p:txBody>
-          <a:bodyPr rtlCol="0" anchor="ctr"/>
-          <a:lstStyle/>
-          <a:p>
-            <a:pPr algn="ctr"/>
-            <a:r>
-              <a:rPr lang="en-US" sz="1200" dirty="0" err="1" smtClean="0"/>
-              <a:t>SCVolHours</a:t>
+              <a:t>SCVolunteerHours</a:t>
             </a:r>
             <a:endParaRPr lang="en-US" sz="1200" dirty="0"/>
           </a:p>
@@ -4911,8 +4275,8 @@
         </p:nvSpPr>
         <p:spPr>
           <a:xfrm>
-            <a:off x="3681482" y="4995018"/>
-            <a:ext cx="1059830" cy="276999"/>
+            <a:off x="3647257" y="4995018"/>
+            <a:ext cx="1128284" cy="276999"/>
           </a:xfrm>
           <a:prstGeom prst="rect">
             <a:avLst/>
@@ -4928,50 +4292,7 @@
             <a:pPr algn="ctr"/>
             <a:r>
               <a:rPr lang="en-US" sz="1200" dirty="0" err="1" smtClean="0"/>
-              <a:t>A_SCCalendar</a:t>
-            </a:r>
-            <a:endParaRPr lang="en-US" sz="1200" dirty="0"/>
-          </a:p>
-        </p:txBody>
-      </p:sp>
-      <p:sp>
-        <p:nvSpPr>
-          <p:cNvPr id="99" name="Rectangle 98"/>
-          <p:cNvSpPr/>
-          <p:nvPr/>
-        </p:nvSpPr>
-        <p:spPr>
-          <a:xfrm>
-            <a:off x="3439499" y="4717682"/>
-            <a:ext cx="1420091" cy="277336"/>
-          </a:xfrm>
-          <a:prstGeom prst="rect">
-            <a:avLst/>
-          </a:prstGeom>
-          <a:ln/>
-        </p:spPr>
-        <p:style>
-          <a:lnRef idx="2">
-            <a:schemeClr val="dk1"/>
-          </a:lnRef>
-          <a:fillRef idx="1">
-            <a:schemeClr val="lt1"/>
-          </a:fillRef>
-          <a:effectRef idx="0">
-            <a:schemeClr val="dk1"/>
-          </a:effectRef>
-          <a:fontRef idx="minor">
-            <a:schemeClr val="dk1"/>
-          </a:fontRef>
-        </p:style>
-        <p:txBody>
-          <a:bodyPr rtlCol="0" anchor="ctr"/>
-          <a:lstStyle/>
-          <a:p>
-            <a:pPr algn="ctr"/>
-            <a:r>
-              <a:rPr lang="en-US" sz="1200" dirty="0" err="1" smtClean="0"/>
-              <a:t>SCCalendar</a:t>
+              <a:t>SCSiteCalendar</a:t>
             </a:r>
             <a:endParaRPr lang="en-US" sz="1200" dirty="0"/>
           </a:p>
@@ -4985,8 +4306,8 @@
         </p:nvSpPr>
         <p:spPr>
           <a:xfrm>
-            <a:off x="5993522" y="4977596"/>
-            <a:ext cx="1197764" cy="276999"/>
+            <a:off x="5469010" y="5001947"/>
+            <a:ext cx="1056700" cy="276999"/>
           </a:xfrm>
           <a:prstGeom prst="rect">
             <a:avLst/>
@@ -5002,50 +4323,7 @@
             <a:pPr algn="ctr"/>
             <a:r>
               <a:rPr lang="en-US" sz="1200" dirty="0" err="1" smtClean="0"/>
-              <a:t>A_SCSiteDefault</a:t>
-            </a:r>
-            <a:endParaRPr lang="en-US" sz="1200" dirty="0"/>
-          </a:p>
-        </p:txBody>
-      </p:sp>
-      <p:sp>
-        <p:nvSpPr>
-          <p:cNvPr id="101" name="Rectangle 100"/>
-          <p:cNvSpPr/>
-          <p:nvPr/>
-        </p:nvSpPr>
-        <p:spPr>
-          <a:xfrm>
-            <a:off x="5820503" y="4700260"/>
-            <a:ext cx="1420091" cy="277336"/>
-          </a:xfrm>
-          <a:prstGeom prst="rect">
-            <a:avLst/>
-          </a:prstGeom>
-          <a:ln/>
-        </p:spPr>
-        <p:style>
-          <a:lnRef idx="2">
-            <a:schemeClr val="dk1"/>
-          </a:lnRef>
-          <a:fillRef idx="1">
-            <a:schemeClr val="lt1"/>
-          </a:fillRef>
-          <a:effectRef idx="0">
-            <a:schemeClr val="dk1"/>
-          </a:effectRef>
-          <a:fontRef idx="minor">
-            <a:schemeClr val="dk1"/>
-          </a:fontRef>
-        </p:style>
-        <p:txBody>
-          <a:bodyPr rtlCol="0" anchor="ctr"/>
-          <a:lstStyle/>
-          <a:p>
-            <a:pPr algn="ctr"/>
-            <a:r>
-              <a:rPr lang="en-US" sz="1200" dirty="0" err="1" smtClean="0"/>
-              <a:t>SCSiteDefault</a:t>
+              <a:t>SCSiteOnDate</a:t>
             </a:r>
             <a:endParaRPr lang="en-US" sz="1200" dirty="0"/>
           </a:p>
@@ -5059,8 +4337,8 @@
         </p:nvSpPr>
         <p:spPr>
           <a:xfrm>
-            <a:off x="5917765" y="5917735"/>
-            <a:ext cx="1349273" cy="276999"/>
+            <a:off x="7419317" y="4995018"/>
+            <a:ext cx="902811" cy="276999"/>
           </a:xfrm>
           <a:prstGeom prst="rect">
             <a:avLst/>
@@ -5076,52 +4354,9 @@
             <a:pPr algn="ctr"/>
             <a:r>
               <a:rPr lang="en-US" sz="1200" dirty="0" err="1" smtClean="0"/>
-              <a:t>A_SCSiteException</a:t>
-            </a:r>
-            <a:endParaRPr lang="en-US" sz="1200" dirty="0"/>
-          </a:p>
-        </p:txBody>
-      </p:sp>
-      <p:sp>
-        <p:nvSpPr>
-          <p:cNvPr id="103" name="Rectangle 102"/>
-          <p:cNvSpPr/>
-          <p:nvPr/>
-        </p:nvSpPr>
-        <p:spPr>
-          <a:xfrm>
-            <a:off x="5820503" y="5640399"/>
-            <a:ext cx="1420091" cy="277336"/>
-          </a:xfrm>
-          <a:prstGeom prst="rect">
-            <a:avLst/>
-          </a:prstGeom>
-          <a:ln/>
-        </p:spPr>
-        <p:style>
-          <a:lnRef idx="2">
-            <a:schemeClr val="dk1"/>
-          </a:lnRef>
-          <a:fillRef idx="1">
-            <a:schemeClr val="lt1"/>
-          </a:fillRef>
-          <a:effectRef idx="0">
-            <a:schemeClr val="dk1"/>
-          </a:effectRef>
-          <a:fontRef idx="minor">
-            <a:schemeClr val="dk1"/>
-          </a:fontRef>
-        </p:style>
-        <p:txBody>
-          <a:bodyPr rtlCol="0" anchor="ctr"/>
-          <a:lstStyle/>
-          <a:p>
-            <a:pPr algn="ctr"/>
-            <a:r>
-              <a:rPr lang="en-US" sz="1200" dirty="0" err="1" smtClean="0"/>
-              <a:t>SCSiteException</a:t>
-            </a:r>
-            <a:endParaRPr lang="en-US" sz="1200" dirty="0"/>
+              <a:t>ShiftDetails</a:t>
+            </a:r>
+            <a:endParaRPr lang="en-US" sz="1200" dirty="0" smtClean="0"/>
           </a:p>
         </p:txBody>
       </p:sp>
@@ -5136,8 +4371,8 @@
         </p:nvCxnSpPr>
         <p:spPr>
           <a:xfrm flipV="1">
-            <a:off x="2573236" y="2729466"/>
-            <a:ext cx="1168589" cy="1832463"/>
+            <a:off x="2254416" y="2714816"/>
+            <a:ext cx="175901" cy="1847113"/>
           </a:xfrm>
           <a:prstGeom prst="curvedConnector3">
             <a:avLst>
@@ -5174,8 +4409,8 @@
         </p:nvCxnSpPr>
         <p:spPr>
           <a:xfrm flipV="1">
-            <a:off x="2573236" y="3851346"/>
-            <a:ext cx="889244" cy="710583"/>
+            <a:off x="2254416" y="3815926"/>
+            <a:ext cx="265812" cy="746003"/>
           </a:xfrm>
           <a:prstGeom prst="curvedConnector3">
             <a:avLst>
@@ -5212,120 +4447,8 @@
         </p:nvCxnSpPr>
         <p:spPr>
           <a:xfrm>
-            <a:off x="2573236" y="4561929"/>
-            <a:ext cx="866263" cy="294421"/>
-          </a:xfrm>
-          <a:prstGeom prst="curvedConnector3">
-            <a:avLst>
-              <a:gd name="adj1" fmla="val 50000"/>
-            </a:avLst>
-          </a:prstGeom>
-          <a:ln w="19050" cmpd="sng">
-            <a:tailEnd type="arrow"/>
-          </a:ln>
-        </p:spPr>
-        <p:style>
-          <a:lnRef idx="1">
-            <a:schemeClr val="dk1"/>
-          </a:lnRef>
-          <a:fillRef idx="0">
-            <a:schemeClr val="dk1"/>
-          </a:fillRef>
-          <a:effectRef idx="0">
-            <a:schemeClr val="dk1"/>
-          </a:effectRef>
-          <a:fontRef idx="minor">
-            <a:schemeClr val="tx1"/>
-          </a:fontRef>
-        </p:style>
-      </p:cxnSp>
-      <p:sp>
-        <p:nvSpPr>
-          <p:cNvPr id="115" name="TextBox 114"/>
-          <p:cNvSpPr txBox="1"/>
-          <p:nvPr/>
-        </p:nvSpPr>
-        <p:spPr>
-          <a:xfrm>
-            <a:off x="3648321" y="5937973"/>
-            <a:ext cx="1172116" cy="276999"/>
-          </a:xfrm>
-          <a:prstGeom prst="rect">
-            <a:avLst/>
-          </a:prstGeom>
-          <a:noFill/>
-        </p:spPr>
-        <p:txBody>
-          <a:bodyPr wrap="none" rtlCol="0">
-            <a:spAutoFit/>
-          </a:bodyPr>
-          <a:lstStyle/>
-          <a:p>
-            <a:pPr algn="ctr"/>
-            <a:r>
-              <a:rPr lang="en-US" sz="1200" dirty="0" err="1" smtClean="0"/>
-              <a:t>A_SCSiteDetails</a:t>
-            </a:r>
-            <a:endParaRPr lang="en-US" sz="1200" dirty="0"/>
-          </a:p>
-        </p:txBody>
-      </p:sp>
-      <p:sp>
-        <p:nvSpPr>
-          <p:cNvPr id="116" name="Rectangle 115"/>
-          <p:cNvSpPr/>
-          <p:nvPr/>
-        </p:nvSpPr>
-        <p:spPr>
-          <a:xfrm>
-            <a:off x="3462480" y="5660637"/>
-            <a:ext cx="1420091" cy="277336"/>
-          </a:xfrm>
-          <a:prstGeom prst="rect">
-            <a:avLst/>
-          </a:prstGeom>
-          <a:ln/>
-        </p:spPr>
-        <p:style>
-          <a:lnRef idx="2">
-            <a:schemeClr val="dk1"/>
-          </a:lnRef>
-          <a:fillRef idx="1">
-            <a:schemeClr val="lt1"/>
-          </a:fillRef>
-          <a:effectRef idx="0">
-            <a:schemeClr val="dk1"/>
-          </a:effectRef>
-          <a:fontRef idx="minor">
-            <a:schemeClr val="dk1"/>
-          </a:fontRef>
-        </p:style>
-        <p:txBody>
-          <a:bodyPr rtlCol="0" anchor="ctr"/>
-          <a:lstStyle/>
-          <a:p>
-            <a:pPr algn="ctr"/>
-            <a:r>
-              <a:rPr lang="en-US" sz="1200" dirty="0" err="1" smtClean="0"/>
-              <a:t>SCSiteDetails</a:t>
-            </a:r>
-            <a:endParaRPr lang="en-US" sz="1200" dirty="0"/>
-          </a:p>
-        </p:txBody>
-      </p:sp>
-      <p:cxnSp>
-        <p:nvCxnSpPr>
-          <p:cNvPr id="117" name="Curved Connector 116"/>
-          <p:cNvCxnSpPr>
-            <a:stCxn id="74" idx="3"/>
-            <a:endCxn id="116" idx="1"/>
-          </p:cNvCxnSpPr>
-          <p:nvPr/>
-        </p:nvCxnSpPr>
-        <p:spPr>
-          <a:xfrm>
-            <a:off x="2573236" y="4561929"/>
-            <a:ext cx="889244" cy="1237376"/>
+            <a:off x="2254416" y="4561929"/>
+            <a:ext cx="1185083" cy="294421"/>
           </a:xfrm>
           <a:prstGeom prst="curvedConnector3">
             <a:avLst>
@@ -5361,9 +4484,9 @@
           <p:nvPr/>
         </p:nvCxnSpPr>
         <p:spPr>
-          <a:xfrm flipV="1">
-            <a:off x="6782184" y="3851346"/>
-            <a:ext cx="515696" cy="1"/>
+          <a:xfrm>
+            <a:off x="7297880" y="3803226"/>
+            <a:ext cx="280261" cy="12700"/>
           </a:xfrm>
           <a:prstGeom prst="curvedConnector3">
             <a:avLst>
@@ -5399,47 +4522,9 @@
           <p:nvPr/>
         </p:nvCxnSpPr>
         <p:spPr>
-          <a:xfrm flipV="1">
-            <a:off x="4859590" y="4838928"/>
-            <a:ext cx="960913" cy="17422"/>
-          </a:xfrm>
-          <a:prstGeom prst="curvedConnector3">
-            <a:avLst>
-              <a:gd name="adj1" fmla="val 50000"/>
-            </a:avLst>
-          </a:prstGeom>
-          <a:ln w="19050" cmpd="sng">
-            <a:tailEnd type="arrow"/>
-          </a:ln>
-        </p:spPr>
-        <p:style>
-          <a:lnRef idx="1">
-            <a:schemeClr val="dk1"/>
-          </a:lnRef>
-          <a:fillRef idx="0">
-            <a:schemeClr val="dk1"/>
-          </a:fillRef>
-          <a:effectRef idx="0">
-            <a:schemeClr val="dk1"/>
-          </a:effectRef>
-          <a:fontRef idx="minor">
-            <a:schemeClr val="tx1"/>
-          </a:fontRef>
-        </p:style>
-      </p:cxnSp>
-      <p:cxnSp>
-        <p:nvCxnSpPr>
-          <p:cNvPr id="126" name="Curved Connector 125"/>
-          <p:cNvCxnSpPr>
-            <a:stCxn id="99" idx="3"/>
-            <a:endCxn id="103" idx="1"/>
-          </p:cNvCxnSpPr>
-          <p:nvPr/>
-        </p:nvCxnSpPr>
-        <p:spPr>
           <a:xfrm>
             <a:off x="4859590" y="4856350"/>
-            <a:ext cx="960913" cy="922717"/>
+            <a:ext cx="365866" cy="6929"/>
           </a:xfrm>
           <a:prstGeom prst="curvedConnector3">
             <a:avLst>
@@ -5568,8 +4653,8 @@
         </p:nvSpPr>
         <p:spPr>
           <a:xfrm>
-            <a:off x="7547842" y="2191981"/>
-            <a:ext cx="1326004" cy="276999"/>
+            <a:off x="5976319" y="2180086"/>
+            <a:ext cx="1244376" cy="276999"/>
           </a:xfrm>
           <a:prstGeom prst="rect">
             <a:avLst/>
@@ -5585,50 +4670,7 @@
             <a:pPr algn="ctr"/>
             <a:r>
               <a:rPr lang="en-US" sz="1200" dirty="0" err="1" smtClean="0"/>
-              <a:t>A_VolPickSiteMap</a:t>
-            </a:r>
-            <a:endParaRPr lang="en-US" sz="1200" dirty="0"/>
-          </a:p>
-        </p:txBody>
-      </p:sp>
-      <p:sp>
-        <p:nvSpPr>
-          <p:cNvPr id="135" name="Rectangle 134"/>
-          <p:cNvSpPr/>
-          <p:nvPr/>
-        </p:nvSpPr>
-        <p:spPr>
-          <a:xfrm>
-            <a:off x="7490129" y="1903193"/>
-            <a:ext cx="1420091" cy="277336"/>
-          </a:xfrm>
-          <a:prstGeom prst="rect">
-            <a:avLst/>
-          </a:prstGeom>
-          <a:ln/>
-        </p:spPr>
-        <p:style>
-          <a:lnRef idx="2">
-            <a:schemeClr val="dk1"/>
-          </a:lnRef>
-          <a:fillRef idx="1">
-            <a:schemeClr val="lt1"/>
-          </a:fillRef>
-          <a:effectRef idx="0">
-            <a:schemeClr val="dk1"/>
-          </a:effectRef>
-          <a:fontRef idx="minor">
-            <a:schemeClr val="dk1"/>
-          </a:fontRef>
-        </p:style>
-        <p:txBody>
-          <a:bodyPr rtlCol="0" anchor="ctr"/>
-          <a:lstStyle/>
-          <a:p>
-            <a:pPr algn="ctr"/>
-            <a:r>
-              <a:rPr lang="en-US" sz="1200" dirty="0" err="1" smtClean="0"/>
-              <a:t>VolPickSiteMap</a:t>
+              <a:t>SitesOnDateMap</a:t>
             </a:r>
             <a:endParaRPr lang="en-US" sz="1200" dirty="0"/>
           </a:p>
@@ -5645,8 +4687,8 @@
         </p:nvCxnSpPr>
         <p:spPr>
           <a:xfrm>
-            <a:off x="7046134" y="1283608"/>
-            <a:ext cx="443995" cy="758253"/>
+            <a:off x="5362093" y="1268679"/>
+            <a:ext cx="515696" cy="761287"/>
           </a:xfrm>
           <a:prstGeom prst="curvedConnector3">
             <a:avLst>
@@ -5655,6 +4697,1230 @@
           </a:prstGeom>
           <a:ln w="19050" cmpd="sng">
             <a:headEnd type="arrow"/>
+            <a:tailEnd type="arrow"/>
+          </a:ln>
+        </p:spPr>
+        <p:style>
+          <a:lnRef idx="1">
+            <a:schemeClr val="dk1"/>
+          </a:lnRef>
+          <a:fillRef idx="0">
+            <a:schemeClr val="dk1"/>
+          </a:fillRef>
+          <a:effectRef idx="0">
+            <a:schemeClr val="dk1"/>
+          </a:effectRef>
+          <a:fontRef idx="minor">
+            <a:schemeClr val="tx1"/>
+          </a:fontRef>
+        </p:style>
+      </p:cxnSp>
+      <p:sp>
+        <p:nvSpPr>
+          <p:cNvPr id="81" name="TextBox 80"/>
+          <p:cNvSpPr txBox="1"/>
+          <p:nvPr/>
+        </p:nvSpPr>
+        <p:spPr>
+          <a:xfrm>
+            <a:off x="2564241" y="3954594"/>
+            <a:ext cx="1332065" cy="276999"/>
+          </a:xfrm>
+          <a:prstGeom prst="rect">
+            <a:avLst/>
+          </a:prstGeom>
+          <a:noFill/>
+        </p:spPr>
+        <p:txBody>
+          <a:bodyPr wrap="none" rtlCol="0">
+            <a:spAutoFit/>
+          </a:bodyPr>
+          <a:lstStyle/>
+          <a:p>
+            <a:pPr algn="ctr"/>
+            <a:r>
+              <a:rPr lang="en-US" sz="1200" dirty="0" err="1" smtClean="0"/>
+              <a:t>SCSiteVolCalendar</a:t>
+            </a:r>
+            <a:endParaRPr lang="en-US" sz="1200" dirty="0"/>
+          </a:p>
+        </p:txBody>
+      </p:sp>
+      <p:cxnSp>
+        <p:nvCxnSpPr>
+          <p:cNvPr id="84" name="Curved Connector 83"/>
+          <p:cNvCxnSpPr>
+            <a:stCxn id="82" idx="3"/>
+            <a:endCxn id="128" idx="1"/>
+          </p:cNvCxnSpPr>
+          <p:nvPr/>
+        </p:nvCxnSpPr>
+        <p:spPr>
+          <a:xfrm flipV="1">
+            <a:off x="3940319" y="3803226"/>
+            <a:ext cx="262940" cy="12700"/>
+          </a:xfrm>
+          <a:prstGeom prst="curvedConnector3">
+            <a:avLst>
+              <a:gd name="adj1" fmla="val 50000"/>
+            </a:avLst>
+          </a:prstGeom>
+          <a:ln w="19050" cmpd="sng">
+            <a:tailEnd type="arrow"/>
+          </a:ln>
+        </p:spPr>
+        <p:style>
+          <a:lnRef idx="1">
+            <a:schemeClr val="dk1"/>
+          </a:lnRef>
+          <a:fillRef idx="0">
+            <a:schemeClr val="dk1"/>
+          </a:fillRef>
+          <a:effectRef idx="0">
+            <a:schemeClr val="dk1"/>
+          </a:effectRef>
+          <a:fontRef idx="minor">
+            <a:schemeClr val="tx1"/>
+          </a:fontRef>
+        </p:style>
+      </p:cxnSp>
+      <p:sp>
+        <p:nvSpPr>
+          <p:cNvPr id="80" name="TextBox 79"/>
+          <p:cNvSpPr txBox="1"/>
+          <p:nvPr/>
+        </p:nvSpPr>
+        <p:spPr>
+          <a:xfrm>
+            <a:off x="5974427" y="1419999"/>
+            <a:ext cx="980106" cy="461665"/>
+          </a:xfrm>
+          <a:prstGeom prst="rect">
+            <a:avLst/>
+          </a:prstGeom>
+          <a:noFill/>
+        </p:spPr>
+        <p:txBody>
+          <a:bodyPr wrap="none" rtlCol="0">
+            <a:spAutoFit/>
+          </a:bodyPr>
+          <a:lstStyle/>
+          <a:p>
+            <a:pPr algn="ctr"/>
+            <a:r>
+              <a:rPr lang="en-US" sz="1200" dirty="0" err="1" smtClean="0"/>
+              <a:t>VolPickShifts</a:t>
+            </a:r>
+            <a:endParaRPr lang="en-US" sz="1200" dirty="0" smtClean="0"/>
+          </a:p>
+          <a:p>
+            <a:pPr algn="ctr"/>
+            <a:endParaRPr lang="en-US" sz="1200" dirty="0"/>
+          </a:p>
+        </p:txBody>
+      </p:sp>
+      <p:cxnSp>
+        <p:nvCxnSpPr>
+          <p:cNvPr id="93" name="Curved Connector 92"/>
+          <p:cNvCxnSpPr>
+            <a:stCxn id="85" idx="3"/>
+            <a:endCxn id="49" idx="1"/>
+          </p:cNvCxnSpPr>
+          <p:nvPr/>
+        </p:nvCxnSpPr>
+        <p:spPr>
+          <a:xfrm>
+            <a:off x="7163856" y="1269879"/>
+            <a:ext cx="414285" cy="122"/>
+          </a:xfrm>
+          <a:prstGeom prst="curvedConnector3">
+            <a:avLst>
+              <a:gd name="adj1" fmla="val 50000"/>
+            </a:avLst>
+          </a:prstGeom>
+          <a:ln w="19050" cmpd="sng">
+            <a:headEnd type="arrow"/>
+            <a:tailEnd type="arrow"/>
+          </a:ln>
+        </p:spPr>
+        <p:style>
+          <a:lnRef idx="1">
+            <a:schemeClr val="dk1"/>
+          </a:lnRef>
+          <a:fillRef idx="0">
+            <a:schemeClr val="dk1"/>
+          </a:fillRef>
+          <a:effectRef idx="0">
+            <a:schemeClr val="dk1"/>
+          </a:effectRef>
+          <a:fontRef idx="minor">
+            <a:schemeClr val="tx1"/>
+          </a:fontRef>
+        </p:style>
+      </p:cxnSp>
+      <p:sp>
+        <p:nvSpPr>
+          <p:cNvPr id="6" name="Rectangle 5"/>
+          <p:cNvSpPr/>
+          <p:nvPr/>
+        </p:nvSpPr>
+        <p:spPr>
+          <a:xfrm>
+            <a:off x="300181" y="253754"/>
+            <a:ext cx="1420091" cy="277336"/>
+          </a:xfrm>
+          <a:prstGeom prst="rect">
+            <a:avLst/>
+          </a:prstGeom>
+          <a:solidFill>
+            <a:srgbClr val="FFFFFF"/>
+          </a:solidFill>
+          <a:ln/>
+        </p:spPr>
+        <p:style>
+          <a:lnRef idx="2">
+            <a:schemeClr val="dk1"/>
+          </a:lnRef>
+          <a:fillRef idx="1">
+            <a:schemeClr val="lt1"/>
+          </a:fillRef>
+          <a:effectRef idx="0">
+            <a:schemeClr val="dk1"/>
+          </a:effectRef>
+          <a:fontRef idx="minor">
+            <a:schemeClr val="dk1"/>
+          </a:fontRef>
+        </p:style>
+        <p:txBody>
+          <a:bodyPr rtlCol="0" anchor="ctr"/>
+          <a:lstStyle/>
+          <a:p>
+            <a:pPr algn="ctr"/>
+            <a:r>
+              <a:rPr lang="en-US" sz="1200" dirty="0" smtClean="0"/>
+              <a:t>Main</a:t>
+            </a:r>
+            <a:endParaRPr lang="en-US" sz="1200" dirty="0"/>
+          </a:p>
+        </p:txBody>
+      </p:sp>
+      <p:sp>
+        <p:nvSpPr>
+          <p:cNvPr id="8" name="Rectangle 7"/>
+          <p:cNvSpPr/>
+          <p:nvPr/>
+        </p:nvSpPr>
+        <p:spPr>
+          <a:xfrm>
+            <a:off x="484909" y="1698075"/>
+            <a:ext cx="1420091" cy="277336"/>
+          </a:xfrm>
+          <a:prstGeom prst="rect">
+            <a:avLst/>
+          </a:prstGeom>
+          <a:solidFill>
+            <a:srgbClr val="FFFFFF"/>
+          </a:solidFill>
+          <a:ln/>
+        </p:spPr>
+        <p:style>
+          <a:lnRef idx="2">
+            <a:schemeClr val="dk1"/>
+          </a:lnRef>
+          <a:fillRef idx="1">
+            <a:schemeClr val="lt1"/>
+          </a:fillRef>
+          <a:effectRef idx="0">
+            <a:schemeClr val="dk1"/>
+          </a:effectRef>
+          <a:fontRef idx="minor">
+            <a:schemeClr val="dk1"/>
+          </a:fontRef>
+        </p:style>
+        <p:txBody>
+          <a:bodyPr rtlCol="0" anchor="ctr"/>
+          <a:lstStyle/>
+          <a:p>
+            <a:pPr algn="ctr"/>
+            <a:r>
+              <a:rPr lang="en-US" sz="1200" dirty="0" smtClean="0"/>
+              <a:t>About</a:t>
+            </a:r>
+            <a:endParaRPr lang="en-US" sz="1200" dirty="0"/>
+          </a:p>
+        </p:txBody>
+      </p:sp>
+      <p:sp>
+        <p:nvSpPr>
+          <p:cNvPr id="10" name="Rectangle 9"/>
+          <p:cNvSpPr/>
+          <p:nvPr/>
+        </p:nvSpPr>
+        <p:spPr>
+          <a:xfrm>
+            <a:off x="674959" y="2452130"/>
+            <a:ext cx="1420091" cy="277336"/>
+          </a:xfrm>
+          <a:prstGeom prst="rect">
+            <a:avLst/>
+          </a:prstGeom>
+          <a:solidFill>
+            <a:srgbClr val="FFFFFF"/>
+          </a:solidFill>
+          <a:ln/>
+        </p:spPr>
+        <p:style>
+          <a:lnRef idx="2">
+            <a:schemeClr val="dk1"/>
+          </a:lnRef>
+          <a:fillRef idx="1">
+            <a:schemeClr val="lt1"/>
+          </a:fillRef>
+          <a:effectRef idx="0">
+            <a:schemeClr val="dk1"/>
+          </a:effectRef>
+          <a:fontRef idx="minor">
+            <a:schemeClr val="dk1"/>
+          </a:fontRef>
+        </p:style>
+        <p:txBody>
+          <a:bodyPr rtlCol="0" anchor="ctr"/>
+          <a:lstStyle/>
+          <a:p>
+            <a:pPr algn="ctr"/>
+            <a:r>
+              <a:rPr lang="en-US" sz="1200" dirty="0" smtClean="0"/>
+              <a:t>Registration</a:t>
+            </a:r>
+            <a:endParaRPr lang="en-US" sz="1200" dirty="0"/>
+          </a:p>
+        </p:txBody>
+      </p:sp>
+      <p:sp>
+        <p:nvSpPr>
+          <p:cNvPr id="19" name="Rectangle 18"/>
+          <p:cNvSpPr/>
+          <p:nvPr/>
+        </p:nvSpPr>
+        <p:spPr>
+          <a:xfrm>
+            <a:off x="2288308" y="278908"/>
+            <a:ext cx="1420091" cy="277336"/>
+          </a:xfrm>
+          <a:prstGeom prst="rect">
+            <a:avLst/>
+          </a:prstGeom>
+          <a:solidFill>
+            <a:srgbClr val="FFFFFF"/>
+          </a:solidFill>
+          <a:ln/>
+        </p:spPr>
+        <p:style>
+          <a:lnRef idx="2">
+            <a:schemeClr val="dk1"/>
+          </a:lnRef>
+          <a:fillRef idx="1">
+            <a:schemeClr val="lt1"/>
+          </a:fillRef>
+          <a:effectRef idx="0">
+            <a:schemeClr val="dk1"/>
+          </a:effectRef>
+          <a:fontRef idx="minor">
+            <a:schemeClr val="dk1"/>
+          </a:fontRef>
+        </p:style>
+        <p:txBody>
+          <a:bodyPr rtlCol="0" anchor="ctr"/>
+          <a:lstStyle/>
+          <a:p>
+            <a:pPr algn="ctr"/>
+            <a:r>
+              <a:rPr lang="en-US" sz="1200" dirty="0" err="1" smtClean="0"/>
+              <a:t>VolunteerOptions</a:t>
+            </a:r>
+            <a:endParaRPr lang="en-US" sz="1200" dirty="0"/>
+          </a:p>
+        </p:txBody>
+      </p:sp>
+      <p:sp>
+        <p:nvSpPr>
+          <p:cNvPr id="21" name="Rectangle 20"/>
+          <p:cNvSpPr/>
+          <p:nvPr/>
+        </p:nvSpPr>
+        <p:spPr>
+          <a:xfrm>
+            <a:off x="4172526" y="292640"/>
+            <a:ext cx="1420091" cy="277336"/>
+          </a:xfrm>
+          <a:prstGeom prst="rect">
+            <a:avLst/>
+          </a:prstGeom>
+          <a:solidFill>
+            <a:srgbClr val="FFFFFF"/>
+          </a:solidFill>
+          <a:ln/>
+        </p:spPr>
+        <p:style>
+          <a:lnRef idx="2">
+            <a:schemeClr val="dk1"/>
+          </a:lnRef>
+          <a:fillRef idx="1">
+            <a:schemeClr val="lt1"/>
+          </a:fillRef>
+          <a:effectRef idx="0">
+            <a:schemeClr val="dk1"/>
+          </a:effectRef>
+          <a:fontRef idx="minor">
+            <a:schemeClr val="dk1"/>
+          </a:fontRef>
+        </p:style>
+        <p:txBody>
+          <a:bodyPr rtlCol="0" anchor="ctr"/>
+          <a:lstStyle/>
+          <a:p>
+            <a:pPr algn="ctr"/>
+            <a:r>
+              <a:rPr lang="en-US" sz="1200" dirty="0" err="1" smtClean="0"/>
+              <a:t>MySignUps</a:t>
+            </a:r>
+            <a:endParaRPr lang="en-US" sz="1200" dirty="0"/>
+          </a:p>
+        </p:txBody>
+      </p:sp>
+      <p:sp>
+        <p:nvSpPr>
+          <p:cNvPr id="23" name="Rectangle 22"/>
+          <p:cNvSpPr/>
+          <p:nvPr/>
+        </p:nvSpPr>
+        <p:spPr>
+          <a:xfrm>
+            <a:off x="7482937" y="253754"/>
+            <a:ext cx="1420091" cy="277336"/>
+          </a:xfrm>
+          <a:prstGeom prst="rect">
+            <a:avLst/>
+          </a:prstGeom>
+          <a:solidFill>
+            <a:srgbClr val="FFFFFF"/>
+          </a:solidFill>
+          <a:ln/>
+        </p:spPr>
+        <p:style>
+          <a:lnRef idx="2">
+            <a:schemeClr val="dk1"/>
+          </a:lnRef>
+          <a:fillRef idx="1">
+            <a:schemeClr val="lt1"/>
+          </a:fillRef>
+          <a:effectRef idx="0">
+            <a:schemeClr val="dk1"/>
+          </a:effectRef>
+          <a:fontRef idx="minor">
+            <a:schemeClr val="dk1"/>
+          </a:fontRef>
+        </p:style>
+        <p:txBody>
+          <a:bodyPr rtlCol="0" anchor="ctr"/>
+          <a:lstStyle/>
+          <a:p>
+            <a:pPr algn="ctr"/>
+            <a:r>
+              <a:rPr lang="en-US" sz="1200" dirty="0" err="1" smtClean="0"/>
+              <a:t>ViewSignUpExisting</a:t>
+            </a:r>
+            <a:endParaRPr lang="en-US" sz="1200" dirty="0"/>
+          </a:p>
+        </p:txBody>
+      </p:sp>
+      <p:sp>
+        <p:nvSpPr>
+          <p:cNvPr id="33" name="Rectangle 32"/>
+          <p:cNvSpPr/>
+          <p:nvPr/>
+        </p:nvSpPr>
+        <p:spPr>
+          <a:xfrm>
+            <a:off x="2321734" y="1924887"/>
+            <a:ext cx="1420091" cy="277336"/>
+          </a:xfrm>
+          <a:prstGeom prst="rect">
+            <a:avLst/>
+          </a:prstGeom>
+          <a:solidFill>
+            <a:srgbClr val="FFFFFF"/>
+          </a:solidFill>
+          <a:ln/>
+        </p:spPr>
+        <p:style>
+          <a:lnRef idx="2">
+            <a:schemeClr val="dk1"/>
+          </a:lnRef>
+          <a:fillRef idx="1">
+            <a:schemeClr val="lt1"/>
+          </a:fillRef>
+          <a:effectRef idx="0">
+            <a:schemeClr val="dk1"/>
+          </a:effectRef>
+          <a:fontRef idx="minor">
+            <a:schemeClr val="dk1"/>
+          </a:fontRef>
+        </p:style>
+        <p:txBody>
+          <a:bodyPr rtlCol="0" anchor="ctr"/>
+          <a:lstStyle/>
+          <a:p>
+            <a:pPr algn="ctr"/>
+            <a:r>
+              <a:rPr lang="en-US" sz="1200" dirty="0" smtClean="0"/>
+              <a:t>Suggestions</a:t>
+            </a:r>
+            <a:endParaRPr lang="en-US" sz="1200" dirty="0"/>
+          </a:p>
+        </p:txBody>
+      </p:sp>
+      <p:sp>
+        <p:nvSpPr>
+          <p:cNvPr id="35" name="Rectangle 34"/>
+          <p:cNvSpPr/>
+          <p:nvPr/>
+        </p:nvSpPr>
+        <p:spPr>
+          <a:xfrm>
+            <a:off x="4011563" y="1936339"/>
+            <a:ext cx="1420091" cy="277336"/>
+          </a:xfrm>
+          <a:prstGeom prst="rect">
+            <a:avLst/>
+          </a:prstGeom>
+          <a:solidFill>
+            <a:srgbClr val="FFFFFF"/>
+          </a:solidFill>
+          <a:ln/>
+        </p:spPr>
+        <p:style>
+          <a:lnRef idx="2">
+            <a:schemeClr val="dk1"/>
+          </a:lnRef>
+          <a:fillRef idx="1">
+            <a:schemeClr val="lt1"/>
+          </a:fillRef>
+          <a:effectRef idx="0">
+            <a:schemeClr val="dk1"/>
+          </a:effectRef>
+          <a:fontRef idx="minor">
+            <a:schemeClr val="dk1"/>
+          </a:fontRef>
+        </p:style>
+        <p:txBody>
+          <a:bodyPr rtlCol="0" anchor="ctr"/>
+          <a:lstStyle/>
+          <a:p>
+            <a:pPr algn="ctr"/>
+            <a:r>
+              <a:rPr lang="en-US" sz="1200" dirty="0" smtClean="0"/>
+              <a:t>Suggestion</a:t>
+            </a:r>
+            <a:endParaRPr lang="en-US" sz="1200" dirty="0"/>
+          </a:p>
+        </p:txBody>
+      </p:sp>
+      <p:sp>
+        <p:nvSpPr>
+          <p:cNvPr id="44" name="Rectangle 43"/>
+          <p:cNvSpPr/>
+          <p:nvPr/>
+        </p:nvSpPr>
+        <p:spPr>
+          <a:xfrm>
+            <a:off x="2239518" y="1129889"/>
+            <a:ext cx="1420091" cy="277336"/>
+          </a:xfrm>
+          <a:prstGeom prst="rect">
+            <a:avLst/>
+          </a:prstGeom>
+          <a:solidFill>
+            <a:srgbClr val="FFFFFF"/>
+          </a:solidFill>
+          <a:ln/>
+        </p:spPr>
+        <p:style>
+          <a:lnRef idx="2">
+            <a:schemeClr val="dk1"/>
+          </a:lnRef>
+          <a:fillRef idx="1">
+            <a:schemeClr val="lt1"/>
+          </a:fillRef>
+          <a:effectRef idx="0">
+            <a:schemeClr val="dk1"/>
+          </a:effectRef>
+          <a:fontRef idx="minor">
+            <a:schemeClr val="dk1"/>
+          </a:fontRef>
+        </p:style>
+        <p:txBody>
+          <a:bodyPr rtlCol="0" anchor="ctr"/>
+          <a:lstStyle/>
+          <a:p>
+            <a:pPr algn="ctr"/>
+            <a:r>
+              <a:rPr lang="en-US" sz="1200" dirty="0" err="1" smtClean="0"/>
+              <a:t>VolCalendar</a:t>
+            </a:r>
+            <a:endParaRPr lang="en-US" sz="1200" dirty="0"/>
+          </a:p>
+        </p:txBody>
+      </p:sp>
+      <p:sp>
+        <p:nvSpPr>
+          <p:cNvPr id="46" name="Rectangle 45"/>
+          <p:cNvSpPr/>
+          <p:nvPr/>
+        </p:nvSpPr>
+        <p:spPr>
+          <a:xfrm>
+            <a:off x="3942002" y="1130011"/>
+            <a:ext cx="1420091" cy="277336"/>
+          </a:xfrm>
+          <a:prstGeom prst="rect">
+            <a:avLst/>
+          </a:prstGeom>
+          <a:solidFill>
+            <a:srgbClr val="FFFFFF"/>
+          </a:solidFill>
+          <a:ln/>
+        </p:spPr>
+        <p:style>
+          <a:lnRef idx="2">
+            <a:schemeClr val="dk1"/>
+          </a:lnRef>
+          <a:fillRef idx="1">
+            <a:schemeClr val="lt1"/>
+          </a:fillRef>
+          <a:effectRef idx="0">
+            <a:schemeClr val="dk1"/>
+          </a:effectRef>
+          <a:fontRef idx="minor">
+            <a:schemeClr val="dk1"/>
+          </a:fontRef>
+        </p:style>
+        <p:txBody>
+          <a:bodyPr rtlCol="0" anchor="ctr"/>
+          <a:lstStyle/>
+          <a:p>
+            <a:pPr algn="ctr"/>
+            <a:r>
+              <a:rPr lang="en-US" sz="1200" dirty="0" err="1" smtClean="0"/>
+              <a:t>VolPickSite</a:t>
+            </a:r>
+            <a:endParaRPr lang="en-US" sz="1200" dirty="0"/>
+          </a:p>
+        </p:txBody>
+      </p:sp>
+      <p:sp>
+        <p:nvSpPr>
+          <p:cNvPr id="49" name="Rectangle 48"/>
+          <p:cNvSpPr/>
+          <p:nvPr/>
+        </p:nvSpPr>
+        <p:spPr>
+          <a:xfrm>
+            <a:off x="7578141" y="1131333"/>
+            <a:ext cx="1420091" cy="277336"/>
+          </a:xfrm>
+          <a:prstGeom prst="rect">
+            <a:avLst/>
+          </a:prstGeom>
+          <a:solidFill>
+            <a:srgbClr val="FFFFFF"/>
+          </a:solidFill>
+          <a:ln/>
+        </p:spPr>
+        <p:style>
+          <a:lnRef idx="2">
+            <a:schemeClr val="dk1"/>
+          </a:lnRef>
+          <a:fillRef idx="1">
+            <a:schemeClr val="lt1"/>
+          </a:fillRef>
+          <a:effectRef idx="0">
+            <a:schemeClr val="dk1"/>
+          </a:effectRef>
+          <a:fontRef idx="minor">
+            <a:schemeClr val="dk1"/>
+          </a:fontRef>
+        </p:style>
+        <p:txBody>
+          <a:bodyPr rtlCol="0" anchor="ctr"/>
+          <a:lstStyle/>
+          <a:p>
+            <a:pPr algn="ctr"/>
+            <a:r>
+              <a:rPr lang="en-US" sz="1200" dirty="0" err="1" smtClean="0"/>
+              <a:t>ViewSignUpNew</a:t>
+            </a:r>
+            <a:endParaRPr lang="en-US" sz="1200" dirty="0"/>
+          </a:p>
+        </p:txBody>
+      </p:sp>
+      <p:sp>
+        <p:nvSpPr>
+          <p:cNvPr id="72" name="Rectangle 71"/>
+          <p:cNvSpPr/>
+          <p:nvPr/>
+        </p:nvSpPr>
+        <p:spPr>
+          <a:xfrm>
+            <a:off x="671946" y="3297012"/>
+            <a:ext cx="1420091" cy="277336"/>
+          </a:xfrm>
+          <a:prstGeom prst="rect">
+            <a:avLst/>
+          </a:prstGeom>
+          <a:solidFill>
+            <a:srgbClr val="FFFFFF"/>
+          </a:solidFill>
+          <a:ln/>
+        </p:spPr>
+        <p:style>
+          <a:lnRef idx="2">
+            <a:schemeClr val="dk1"/>
+          </a:lnRef>
+          <a:fillRef idx="1">
+            <a:schemeClr val="lt1"/>
+          </a:fillRef>
+          <a:effectRef idx="0">
+            <a:schemeClr val="dk1"/>
+          </a:effectRef>
+          <a:fontRef idx="minor">
+            <a:schemeClr val="dk1"/>
+          </a:fontRef>
+        </p:style>
+        <p:txBody>
+          <a:bodyPr rtlCol="0" anchor="ctr"/>
+          <a:lstStyle/>
+          <a:p>
+            <a:pPr algn="ctr"/>
+            <a:r>
+              <a:rPr lang="en-US" sz="1200" dirty="0" err="1" smtClean="0"/>
+              <a:t>SCMySites</a:t>
+            </a:r>
+            <a:endParaRPr lang="en-US" sz="1200" dirty="0"/>
+          </a:p>
+        </p:txBody>
+      </p:sp>
+      <p:sp>
+        <p:nvSpPr>
+          <p:cNvPr id="74" name="Rectangle 73"/>
+          <p:cNvSpPr/>
+          <p:nvPr/>
+        </p:nvSpPr>
+        <p:spPr>
+          <a:xfrm>
+            <a:off x="834325" y="4423261"/>
+            <a:ext cx="1420091" cy="277336"/>
+          </a:xfrm>
+          <a:prstGeom prst="rect">
+            <a:avLst/>
+          </a:prstGeom>
+          <a:solidFill>
+            <a:srgbClr val="FFFFFF"/>
+          </a:solidFill>
+          <a:ln/>
+        </p:spPr>
+        <p:style>
+          <a:lnRef idx="2">
+            <a:schemeClr val="dk1"/>
+          </a:lnRef>
+          <a:fillRef idx="1">
+            <a:schemeClr val="lt1"/>
+          </a:fillRef>
+          <a:effectRef idx="0">
+            <a:schemeClr val="dk1"/>
+          </a:effectRef>
+          <a:fontRef idx="minor">
+            <a:schemeClr val="dk1"/>
+          </a:fontRef>
+        </p:style>
+        <p:txBody>
+          <a:bodyPr rtlCol="0" anchor="ctr"/>
+          <a:lstStyle/>
+          <a:p>
+            <a:pPr algn="ctr"/>
+            <a:r>
+              <a:rPr lang="en-US" sz="1200" dirty="0" err="1" smtClean="0"/>
+              <a:t>SCSite</a:t>
+            </a:r>
+            <a:endParaRPr lang="en-US" sz="1200" dirty="0"/>
+          </a:p>
+        </p:txBody>
+      </p:sp>
+      <p:sp>
+        <p:nvSpPr>
+          <p:cNvPr id="95" name="Rectangle 94"/>
+          <p:cNvSpPr/>
+          <p:nvPr/>
+        </p:nvSpPr>
+        <p:spPr>
+          <a:xfrm>
+            <a:off x="5877789" y="3664558"/>
+            <a:ext cx="1420091" cy="277336"/>
+          </a:xfrm>
+          <a:prstGeom prst="rect">
+            <a:avLst/>
+          </a:prstGeom>
+          <a:solidFill>
+            <a:srgbClr val="FFFFFF"/>
+          </a:solidFill>
+          <a:ln/>
+        </p:spPr>
+        <p:style>
+          <a:lnRef idx="2">
+            <a:schemeClr val="dk1"/>
+          </a:lnRef>
+          <a:fillRef idx="1">
+            <a:schemeClr val="lt1"/>
+          </a:fillRef>
+          <a:effectRef idx="0">
+            <a:schemeClr val="dk1"/>
+          </a:effectRef>
+          <a:fontRef idx="minor">
+            <a:schemeClr val="dk1"/>
+          </a:fontRef>
+        </p:style>
+        <p:txBody>
+          <a:bodyPr rtlCol="0" anchor="ctr"/>
+          <a:lstStyle/>
+          <a:p>
+            <a:pPr algn="ctr"/>
+            <a:r>
+              <a:rPr lang="en-US" sz="1200" dirty="0" err="1" smtClean="0"/>
+              <a:t>SCSiteVol</a:t>
+            </a:r>
+            <a:endParaRPr lang="en-US" sz="1200" dirty="0"/>
+          </a:p>
+        </p:txBody>
+      </p:sp>
+      <p:sp>
+        <p:nvSpPr>
+          <p:cNvPr id="97" name="Rectangle 96"/>
+          <p:cNvSpPr/>
+          <p:nvPr/>
+        </p:nvSpPr>
+        <p:spPr>
+          <a:xfrm>
+            <a:off x="7578141" y="3664558"/>
+            <a:ext cx="1420091" cy="277336"/>
+          </a:xfrm>
+          <a:prstGeom prst="rect">
+            <a:avLst/>
+          </a:prstGeom>
+          <a:solidFill>
+            <a:srgbClr val="FFFFFF"/>
+          </a:solidFill>
+          <a:ln/>
+        </p:spPr>
+        <p:style>
+          <a:lnRef idx="2">
+            <a:schemeClr val="dk1"/>
+          </a:lnRef>
+          <a:fillRef idx="1">
+            <a:schemeClr val="lt1"/>
+          </a:fillRef>
+          <a:effectRef idx="0">
+            <a:schemeClr val="dk1"/>
+          </a:effectRef>
+          <a:fontRef idx="minor">
+            <a:schemeClr val="dk1"/>
+          </a:fontRef>
+        </p:style>
+        <p:txBody>
+          <a:bodyPr rtlCol="0" anchor="ctr"/>
+          <a:lstStyle/>
+          <a:p>
+            <a:pPr algn="ctr"/>
+            <a:r>
+              <a:rPr lang="en-US" sz="1200" dirty="0" err="1" smtClean="0"/>
+              <a:t>SCVolHours</a:t>
+            </a:r>
+            <a:endParaRPr lang="en-US" sz="1200" dirty="0"/>
+          </a:p>
+        </p:txBody>
+      </p:sp>
+      <p:sp>
+        <p:nvSpPr>
+          <p:cNvPr id="99" name="Rectangle 98"/>
+          <p:cNvSpPr/>
+          <p:nvPr/>
+        </p:nvSpPr>
+        <p:spPr>
+          <a:xfrm>
+            <a:off x="3439499" y="4717682"/>
+            <a:ext cx="1420091" cy="277336"/>
+          </a:xfrm>
+          <a:prstGeom prst="rect">
+            <a:avLst/>
+          </a:prstGeom>
+          <a:solidFill>
+            <a:srgbClr val="FFFFFF"/>
+          </a:solidFill>
+          <a:ln/>
+        </p:spPr>
+        <p:style>
+          <a:lnRef idx="2">
+            <a:schemeClr val="dk1"/>
+          </a:lnRef>
+          <a:fillRef idx="1">
+            <a:schemeClr val="lt1"/>
+          </a:fillRef>
+          <a:effectRef idx="0">
+            <a:schemeClr val="dk1"/>
+          </a:effectRef>
+          <a:fontRef idx="minor">
+            <a:schemeClr val="dk1"/>
+          </a:fontRef>
+        </p:style>
+        <p:txBody>
+          <a:bodyPr rtlCol="0" anchor="ctr"/>
+          <a:lstStyle/>
+          <a:p>
+            <a:pPr algn="ctr"/>
+            <a:r>
+              <a:rPr lang="en-US" sz="1200" dirty="0" err="1" smtClean="0"/>
+              <a:t>SCCalendar</a:t>
+            </a:r>
+            <a:endParaRPr lang="en-US" sz="1200" dirty="0"/>
+          </a:p>
+        </p:txBody>
+      </p:sp>
+      <p:sp>
+        <p:nvSpPr>
+          <p:cNvPr id="101" name="Rectangle 100"/>
+          <p:cNvSpPr/>
+          <p:nvPr/>
+        </p:nvSpPr>
+        <p:spPr>
+          <a:xfrm>
+            <a:off x="5225456" y="4724611"/>
+            <a:ext cx="1420091" cy="277336"/>
+          </a:xfrm>
+          <a:prstGeom prst="rect">
+            <a:avLst/>
+          </a:prstGeom>
+          <a:solidFill>
+            <a:srgbClr val="FFFFFF"/>
+          </a:solidFill>
+          <a:ln/>
+        </p:spPr>
+        <p:style>
+          <a:lnRef idx="2">
+            <a:schemeClr val="dk1"/>
+          </a:lnRef>
+          <a:fillRef idx="1">
+            <a:schemeClr val="lt1"/>
+          </a:fillRef>
+          <a:effectRef idx="0">
+            <a:schemeClr val="dk1"/>
+          </a:effectRef>
+          <a:fontRef idx="minor">
+            <a:schemeClr val="dk1"/>
+          </a:fontRef>
+        </p:style>
+        <p:txBody>
+          <a:bodyPr rtlCol="0" anchor="ctr"/>
+          <a:lstStyle/>
+          <a:p>
+            <a:pPr algn="ctr"/>
+            <a:r>
+              <a:rPr lang="en-US" sz="1200" dirty="0" err="1" smtClean="0"/>
+              <a:t>SCSiteCalShifts</a:t>
+            </a:r>
+            <a:endParaRPr lang="en-US" sz="1200" dirty="0"/>
+          </a:p>
+        </p:txBody>
+      </p:sp>
+      <p:sp>
+        <p:nvSpPr>
+          <p:cNvPr id="103" name="Rectangle 102"/>
+          <p:cNvSpPr/>
+          <p:nvPr/>
+        </p:nvSpPr>
+        <p:spPr>
+          <a:xfrm>
+            <a:off x="7098819" y="4717682"/>
+            <a:ext cx="1420091" cy="277336"/>
+          </a:xfrm>
+          <a:prstGeom prst="rect">
+            <a:avLst/>
+          </a:prstGeom>
+          <a:solidFill>
+            <a:srgbClr val="FFFFFF"/>
+          </a:solidFill>
+          <a:ln/>
+        </p:spPr>
+        <p:style>
+          <a:lnRef idx="2">
+            <a:schemeClr val="dk1"/>
+          </a:lnRef>
+          <a:fillRef idx="1">
+            <a:schemeClr val="lt1"/>
+          </a:fillRef>
+          <a:effectRef idx="0">
+            <a:schemeClr val="dk1"/>
+          </a:effectRef>
+          <a:fontRef idx="minor">
+            <a:schemeClr val="dk1"/>
+          </a:fontRef>
+        </p:style>
+        <p:txBody>
+          <a:bodyPr rtlCol="0" anchor="ctr"/>
+          <a:lstStyle/>
+          <a:p>
+            <a:pPr algn="ctr"/>
+            <a:r>
+              <a:rPr lang="en-US" sz="1200" dirty="0" err="1" smtClean="0"/>
+              <a:t>SCShiftDetails</a:t>
+            </a:r>
+            <a:endParaRPr lang="en-US" sz="1200" dirty="0"/>
+          </a:p>
+        </p:txBody>
+      </p:sp>
+      <p:sp>
+        <p:nvSpPr>
+          <p:cNvPr id="135" name="Rectangle 134"/>
+          <p:cNvSpPr/>
+          <p:nvPr/>
+        </p:nvSpPr>
+        <p:spPr>
+          <a:xfrm>
+            <a:off x="5877789" y="1891298"/>
+            <a:ext cx="1420091" cy="277336"/>
+          </a:xfrm>
+          <a:prstGeom prst="rect">
+            <a:avLst/>
+          </a:prstGeom>
+          <a:solidFill>
+            <a:srgbClr val="FFFFFF"/>
+          </a:solidFill>
+          <a:ln/>
+        </p:spPr>
+        <p:style>
+          <a:lnRef idx="2">
+            <a:schemeClr val="dk1"/>
+          </a:lnRef>
+          <a:fillRef idx="1">
+            <a:schemeClr val="lt1"/>
+          </a:fillRef>
+          <a:effectRef idx="0">
+            <a:schemeClr val="dk1"/>
+          </a:effectRef>
+          <a:fontRef idx="minor">
+            <a:schemeClr val="dk1"/>
+          </a:fontRef>
+        </p:style>
+        <p:txBody>
+          <a:bodyPr rtlCol="0" anchor="ctr"/>
+          <a:lstStyle/>
+          <a:p>
+            <a:pPr algn="ctr"/>
+            <a:r>
+              <a:rPr lang="en-US" sz="1200" dirty="0" err="1" smtClean="0"/>
+              <a:t>VolPickSiteMap</a:t>
+            </a:r>
+            <a:endParaRPr lang="en-US" sz="1200" dirty="0"/>
+          </a:p>
+        </p:txBody>
+      </p:sp>
+      <p:sp>
+        <p:nvSpPr>
+          <p:cNvPr id="82" name="Rectangle 81"/>
+          <p:cNvSpPr/>
+          <p:nvPr/>
+        </p:nvSpPr>
+        <p:spPr>
+          <a:xfrm>
+            <a:off x="2520228" y="3677258"/>
+            <a:ext cx="1420091" cy="277336"/>
+          </a:xfrm>
+          <a:prstGeom prst="rect">
+            <a:avLst/>
+          </a:prstGeom>
+          <a:solidFill>
+            <a:srgbClr val="FFFFFF"/>
+          </a:solidFill>
+          <a:ln/>
+        </p:spPr>
+        <p:style>
+          <a:lnRef idx="2">
+            <a:schemeClr val="dk1"/>
+          </a:lnRef>
+          <a:fillRef idx="1">
+            <a:schemeClr val="lt1"/>
+          </a:fillRef>
+          <a:effectRef idx="0">
+            <a:schemeClr val="dk1"/>
+          </a:effectRef>
+          <a:fontRef idx="minor">
+            <a:schemeClr val="dk1"/>
+          </a:fontRef>
+        </p:style>
+        <p:txBody>
+          <a:bodyPr rtlCol="0" anchor="ctr"/>
+          <a:lstStyle/>
+          <a:p>
+            <a:pPr algn="ctr"/>
+            <a:r>
+              <a:rPr lang="en-US" sz="1200" dirty="0" err="1" smtClean="0"/>
+              <a:t>SCSiteVolCalendar</a:t>
+            </a:r>
+            <a:endParaRPr lang="en-US" sz="1200" dirty="0" smtClean="0"/>
+          </a:p>
+        </p:txBody>
+      </p:sp>
+      <p:sp>
+        <p:nvSpPr>
+          <p:cNvPr id="85" name="Rectangle 84"/>
+          <p:cNvSpPr/>
+          <p:nvPr/>
+        </p:nvSpPr>
+        <p:spPr>
+          <a:xfrm>
+            <a:off x="5743765" y="1131211"/>
+            <a:ext cx="1420091" cy="277336"/>
+          </a:xfrm>
+          <a:prstGeom prst="rect">
+            <a:avLst/>
+          </a:prstGeom>
+          <a:solidFill>
+            <a:srgbClr val="FFFFFF"/>
+          </a:solidFill>
+          <a:ln/>
+        </p:spPr>
+        <p:style>
+          <a:lnRef idx="2">
+            <a:schemeClr val="dk1"/>
+          </a:lnRef>
+          <a:fillRef idx="1">
+            <a:schemeClr val="lt1"/>
+          </a:fillRef>
+          <a:effectRef idx="0">
+            <a:schemeClr val="dk1"/>
+          </a:effectRef>
+          <a:fontRef idx="minor">
+            <a:schemeClr val="dk1"/>
+          </a:fontRef>
+        </p:style>
+        <p:txBody>
+          <a:bodyPr rtlCol="0" anchor="ctr"/>
+          <a:lstStyle/>
+          <a:p>
+            <a:pPr algn="ctr"/>
+            <a:r>
+              <a:rPr lang="en-US" sz="1200" dirty="0" err="1" smtClean="0"/>
+              <a:t>VolPickShift</a:t>
+            </a:r>
+            <a:endParaRPr lang="en-US" sz="1200" dirty="0"/>
+          </a:p>
+        </p:txBody>
+      </p:sp>
+      <p:sp>
+        <p:nvSpPr>
+          <p:cNvPr id="127" name="TextBox 126"/>
+          <p:cNvSpPr txBox="1"/>
+          <p:nvPr/>
+        </p:nvSpPr>
+        <p:spPr>
+          <a:xfrm>
+            <a:off x="4594284" y="3941894"/>
+            <a:ext cx="761747" cy="276999"/>
+          </a:xfrm>
+          <a:prstGeom prst="rect">
+            <a:avLst/>
+          </a:prstGeom>
+          <a:noFill/>
+        </p:spPr>
+        <p:txBody>
+          <a:bodyPr wrap="none" rtlCol="0">
+            <a:spAutoFit/>
+          </a:bodyPr>
+          <a:lstStyle/>
+          <a:p>
+            <a:pPr algn="ctr"/>
+            <a:r>
+              <a:rPr lang="en-US" sz="1200" dirty="0" err="1" smtClean="0"/>
+              <a:t>SiteShifts</a:t>
+            </a:r>
+            <a:endParaRPr lang="en-US" sz="1200" dirty="0"/>
+          </a:p>
+        </p:txBody>
+      </p:sp>
+      <p:sp>
+        <p:nvSpPr>
+          <p:cNvPr id="128" name="Rectangle 127"/>
+          <p:cNvSpPr/>
+          <p:nvPr/>
+        </p:nvSpPr>
+        <p:spPr>
+          <a:xfrm>
+            <a:off x="4203259" y="3664558"/>
+            <a:ext cx="1420091" cy="277336"/>
+          </a:xfrm>
+          <a:prstGeom prst="rect">
+            <a:avLst/>
+          </a:prstGeom>
+          <a:solidFill>
+            <a:srgbClr val="FFFFFF"/>
+          </a:solidFill>
+          <a:ln/>
+        </p:spPr>
+        <p:style>
+          <a:lnRef idx="2">
+            <a:schemeClr val="dk1"/>
+          </a:lnRef>
+          <a:fillRef idx="1">
+            <a:schemeClr val="lt1"/>
+          </a:fillRef>
+          <a:effectRef idx="0">
+            <a:schemeClr val="dk1"/>
+          </a:effectRef>
+          <a:fontRef idx="minor">
+            <a:schemeClr val="dk1"/>
+          </a:fontRef>
+        </p:style>
+        <p:txBody>
+          <a:bodyPr rtlCol="0" anchor="ctr"/>
+          <a:lstStyle/>
+          <a:p>
+            <a:pPr algn="ctr"/>
+            <a:r>
+              <a:rPr lang="en-US" sz="1200" dirty="0" err="1" smtClean="0"/>
+              <a:t>SCSiteShifts</a:t>
+            </a:r>
+            <a:endParaRPr lang="en-US" sz="1200" dirty="0"/>
+          </a:p>
+        </p:txBody>
+      </p:sp>
+      <p:cxnSp>
+        <p:nvCxnSpPr>
+          <p:cNvPr id="137" name="Curved Connector 136"/>
+          <p:cNvCxnSpPr>
+            <a:stCxn id="128" idx="3"/>
+            <a:endCxn id="95" idx="1"/>
+          </p:cNvCxnSpPr>
+          <p:nvPr/>
+        </p:nvCxnSpPr>
+        <p:spPr>
+          <a:xfrm>
+            <a:off x="5623350" y="3803226"/>
+            <a:ext cx="254439" cy="12700"/>
+          </a:xfrm>
+          <a:prstGeom prst="curvedConnector3">
+            <a:avLst>
+              <a:gd name="adj1" fmla="val 50000"/>
+            </a:avLst>
+          </a:prstGeom>
+          <a:ln w="19050" cmpd="sng">
             <a:tailEnd type="arrow"/>
           </a:ln>
         </p:spPr>
@@ -5675,27 +5941,25 @@
       </p:cxnSp>
       <p:cxnSp>
         <p:nvCxnSpPr>
-          <p:cNvPr id="140" name="Curved Connector 139"/>
+          <p:cNvPr id="138" name="Curved Connector 137"/>
           <p:cNvCxnSpPr>
-            <a:stCxn id="48" idx="2"/>
-            <a:endCxn id="135" idx="1"/>
+            <a:stCxn id="101" idx="3"/>
+            <a:endCxn id="103" idx="1"/>
           </p:cNvCxnSpPr>
           <p:nvPr/>
         </p:nvCxnSpPr>
         <p:spPr>
-          <a:xfrm rot="5400000">
-            <a:off x="7683351" y="1514365"/>
-            <a:ext cx="334274" cy="720718"/>
-          </a:xfrm>
-          <a:prstGeom prst="curvedConnector4">
+          <a:xfrm flipV="1">
+            <a:off x="6645547" y="4856350"/>
+            <a:ext cx="453272" cy="6929"/>
+          </a:xfrm>
+          <a:prstGeom prst="curvedConnector3">
             <a:avLst>
-              <a:gd name="adj1" fmla="val 29258"/>
-              <a:gd name="adj2" fmla="val 131718"/>
+              <a:gd name="adj1" fmla="val 50000"/>
             </a:avLst>
           </a:prstGeom>
           <a:ln w="19050" cmpd="sng">
-            <a:headEnd type="arrow"/>
-            <a:tailEnd type="none"/>
+            <a:tailEnd type="arrow"/>
           </a:ln>
         </p:spPr>
         <p:style>
@@ -5713,97 +5977,23 @@
           </a:fontRef>
         </p:style>
       </p:cxnSp>
-      <p:sp>
-        <p:nvSpPr>
-          <p:cNvPr id="81" name="TextBox 80"/>
-          <p:cNvSpPr txBox="1"/>
-          <p:nvPr/>
-        </p:nvSpPr>
-        <p:spPr>
-          <a:xfrm>
-            <a:off x="3423650" y="3990014"/>
-            <a:ext cx="1497751" cy="276999"/>
-          </a:xfrm>
-          <a:prstGeom prst="rect">
-            <a:avLst/>
-          </a:prstGeom>
-          <a:noFill/>
-        </p:spPr>
-        <p:txBody>
-          <a:bodyPr wrap="none" rtlCol="0">
-            <a:spAutoFit/>
-          </a:bodyPr>
-          <a:lstStyle/>
-          <a:p>
-            <a:pPr algn="ctr"/>
-            <a:r>
-              <a:rPr lang="en-US" sz="1200" dirty="0" err="1" smtClean="0"/>
-              <a:t>A_SCSiteVolCalendar</a:t>
-            </a:r>
-            <a:endParaRPr lang="en-US" sz="1200" dirty="0"/>
-          </a:p>
-        </p:txBody>
-      </p:sp>
-      <p:sp>
-        <p:nvSpPr>
-          <p:cNvPr id="82" name="Rectangle 81"/>
-          <p:cNvSpPr/>
-          <p:nvPr/>
-        </p:nvSpPr>
-        <p:spPr>
-          <a:xfrm>
-            <a:off x="3462480" y="3712678"/>
-            <a:ext cx="1420091" cy="277336"/>
-          </a:xfrm>
-          <a:prstGeom prst="rect">
-            <a:avLst/>
-          </a:prstGeom>
-          <a:ln/>
-        </p:spPr>
-        <p:style>
-          <a:lnRef idx="2">
-            <a:schemeClr val="dk1"/>
-          </a:lnRef>
-          <a:fillRef idx="1">
-            <a:schemeClr val="lt1"/>
-          </a:fillRef>
-          <a:effectRef idx="0">
-            <a:schemeClr val="dk1"/>
-          </a:effectRef>
-          <a:fontRef idx="minor">
-            <a:schemeClr val="dk1"/>
-          </a:fontRef>
-        </p:style>
-        <p:txBody>
-          <a:bodyPr rtlCol="0" anchor="ctr"/>
-          <a:lstStyle/>
-          <a:p>
-            <a:pPr algn="ctr"/>
-            <a:r>
-              <a:rPr lang="en-US" sz="1200" dirty="0" err="1" smtClean="0"/>
-              <a:t>SCSiteVolCalendar</a:t>
-            </a:r>
-            <a:endParaRPr lang="en-US" sz="1200" dirty="0" smtClean="0"/>
-          </a:p>
-        </p:txBody>
-      </p:sp>
       <p:cxnSp>
         <p:nvCxnSpPr>
-          <p:cNvPr id="84" name="Curved Connector 83"/>
+          <p:cNvPr id="139" name="Curved Connector 138"/>
           <p:cNvCxnSpPr>
-            <a:stCxn id="82" idx="3"/>
-            <a:endCxn id="95" idx="1"/>
+            <a:stCxn id="21" idx="3"/>
+            <a:endCxn id="49" idx="1"/>
           </p:cNvCxnSpPr>
           <p:nvPr/>
         </p:nvCxnSpPr>
         <p:spPr>
           <a:xfrm>
-            <a:off x="4882571" y="3851346"/>
-            <a:ext cx="479522" cy="1"/>
+            <a:off x="5592617" y="431308"/>
+            <a:ext cx="1985524" cy="838693"/>
           </a:xfrm>
           <a:prstGeom prst="curvedConnector3">
             <a:avLst>
-              <a:gd name="adj1" fmla="val 50000"/>
+              <a:gd name="adj1" fmla="val 77330"/>
             </a:avLst>
           </a:prstGeom>
           <a:ln w="19050" cmpd="sng">
@@ -5825,6 +6015,36 @@
           </a:fontRef>
         </p:style>
       </p:cxnSp>
+      <p:sp>
+        <p:nvSpPr>
+          <p:cNvPr id="143" name="TextBox 142"/>
+          <p:cNvSpPr txBox="1"/>
+          <p:nvPr/>
+        </p:nvSpPr>
+        <p:spPr>
+          <a:xfrm>
+            <a:off x="6634711" y="490758"/>
+            <a:ext cx="496538" cy="369332"/>
+          </a:xfrm>
+          <a:prstGeom prst="rect">
+            <a:avLst/>
+          </a:prstGeom>
+          <a:noFill/>
+        </p:spPr>
+        <p:txBody>
+          <a:bodyPr wrap="none" rtlCol="0">
+            <a:spAutoFit/>
+          </a:bodyPr>
+          <a:lstStyle/>
+          <a:p>
+            <a:r>
+              <a:rPr lang="en-US" dirty="0" err="1" smtClean="0"/>
+              <a:t>iOS</a:t>
+            </a:r>
+            <a:endParaRPr lang="en-US" dirty="0"/>
+          </a:p>
+        </p:txBody>
+      </p:sp>
     </p:spTree>
     <p:extLst>
       <p:ext uri="{BB962C8B-B14F-4D97-AF65-F5344CB8AC3E}">

</xml_diff>